<commit_message>
2023.02.22. Day 3 본문 작성 완료
</commit_message>
<xml_diff>
--- a/Resources/그림판.pptx
+++ b/Resources/그림판.pptx
@@ -18,7 +18,9 @@
     <p:sldId id="267" r:id="rId12"/>
     <p:sldId id="266" r:id="rId13"/>
     <p:sldId id="269" r:id="rId14"/>
-    <p:sldId id="268" r:id="rId15"/>
+    <p:sldId id="270" r:id="rId15"/>
+    <p:sldId id="271" r:id="rId16"/>
+    <p:sldId id="268" r:id="rId17"/>
   </p:sldIdLst>
   <p:sldSz cx="12192000" cy="6858000"/>
   <p:notesSz cx="6858000" cy="9144000"/>
@@ -272,7 +274,7 @@
           <a:p>
             <a:fld id="{D2046D81-BFF8-4449-968B-536CE4C16F6D}" type="datetimeFigureOut">
               <a:rPr lang="ko-KR" altLang="en-US" smtClean="0"/>
-              <a:t>2023-02-16</a:t>
+              <a:t>2023-02-21</a:t>
             </a:fld>
             <a:endParaRPr lang="ko-KR" altLang="en-US"/>
           </a:p>
@@ -470,7 +472,7 @@
           <a:p>
             <a:fld id="{D2046D81-BFF8-4449-968B-536CE4C16F6D}" type="datetimeFigureOut">
               <a:rPr lang="ko-KR" altLang="en-US" smtClean="0"/>
-              <a:t>2023-02-16</a:t>
+              <a:t>2023-02-21</a:t>
             </a:fld>
             <a:endParaRPr lang="ko-KR" altLang="en-US"/>
           </a:p>
@@ -678,7 +680,7 @@
           <a:p>
             <a:fld id="{D2046D81-BFF8-4449-968B-536CE4C16F6D}" type="datetimeFigureOut">
               <a:rPr lang="ko-KR" altLang="en-US" smtClean="0"/>
-              <a:t>2023-02-16</a:t>
+              <a:t>2023-02-21</a:t>
             </a:fld>
             <a:endParaRPr lang="ko-KR" altLang="en-US"/>
           </a:p>
@@ -876,7 +878,7 @@
           <a:p>
             <a:fld id="{D2046D81-BFF8-4449-968B-536CE4C16F6D}" type="datetimeFigureOut">
               <a:rPr lang="ko-KR" altLang="en-US" smtClean="0"/>
-              <a:t>2023-02-16</a:t>
+              <a:t>2023-02-21</a:t>
             </a:fld>
             <a:endParaRPr lang="ko-KR" altLang="en-US"/>
           </a:p>
@@ -1151,7 +1153,7 @@
           <a:p>
             <a:fld id="{D2046D81-BFF8-4449-968B-536CE4C16F6D}" type="datetimeFigureOut">
               <a:rPr lang="ko-KR" altLang="en-US" smtClean="0"/>
-              <a:t>2023-02-16</a:t>
+              <a:t>2023-02-21</a:t>
             </a:fld>
             <a:endParaRPr lang="ko-KR" altLang="en-US"/>
           </a:p>
@@ -1416,7 +1418,7 @@
           <a:p>
             <a:fld id="{D2046D81-BFF8-4449-968B-536CE4C16F6D}" type="datetimeFigureOut">
               <a:rPr lang="ko-KR" altLang="en-US" smtClean="0"/>
-              <a:t>2023-02-16</a:t>
+              <a:t>2023-02-21</a:t>
             </a:fld>
             <a:endParaRPr lang="ko-KR" altLang="en-US"/>
           </a:p>
@@ -1828,7 +1830,7 @@
           <a:p>
             <a:fld id="{D2046D81-BFF8-4449-968B-536CE4C16F6D}" type="datetimeFigureOut">
               <a:rPr lang="ko-KR" altLang="en-US" smtClean="0"/>
-              <a:t>2023-02-16</a:t>
+              <a:t>2023-02-21</a:t>
             </a:fld>
             <a:endParaRPr lang="ko-KR" altLang="en-US"/>
           </a:p>
@@ -1969,7 +1971,7 @@
           <a:p>
             <a:fld id="{D2046D81-BFF8-4449-968B-536CE4C16F6D}" type="datetimeFigureOut">
               <a:rPr lang="ko-KR" altLang="en-US" smtClean="0"/>
-              <a:t>2023-02-16</a:t>
+              <a:t>2023-02-21</a:t>
             </a:fld>
             <a:endParaRPr lang="ko-KR" altLang="en-US"/>
           </a:p>
@@ -2082,7 +2084,7 @@
           <a:p>
             <a:fld id="{D2046D81-BFF8-4449-968B-536CE4C16F6D}" type="datetimeFigureOut">
               <a:rPr lang="ko-KR" altLang="en-US" smtClean="0"/>
-              <a:t>2023-02-16</a:t>
+              <a:t>2023-02-21</a:t>
             </a:fld>
             <a:endParaRPr lang="ko-KR" altLang="en-US"/>
           </a:p>
@@ -2393,7 +2395,7 @@
           <a:p>
             <a:fld id="{D2046D81-BFF8-4449-968B-536CE4C16F6D}" type="datetimeFigureOut">
               <a:rPr lang="ko-KR" altLang="en-US" smtClean="0"/>
-              <a:t>2023-02-16</a:t>
+              <a:t>2023-02-21</a:t>
             </a:fld>
             <a:endParaRPr lang="ko-KR" altLang="en-US"/>
           </a:p>
@@ -2681,7 +2683,7 @@
           <a:p>
             <a:fld id="{D2046D81-BFF8-4449-968B-536CE4C16F6D}" type="datetimeFigureOut">
               <a:rPr lang="ko-KR" altLang="en-US" smtClean="0"/>
-              <a:t>2023-02-16</a:t>
+              <a:t>2023-02-21</a:t>
             </a:fld>
             <a:endParaRPr lang="ko-KR" altLang="en-US"/>
           </a:p>
@@ -2922,7 +2924,7 @@
           <a:p>
             <a:fld id="{D2046D81-BFF8-4449-968B-536CE4C16F6D}" type="datetimeFigureOut">
               <a:rPr lang="ko-KR" altLang="en-US" smtClean="0"/>
-              <a:t>2023-02-16</a:t>
+              <a:t>2023-02-21</a:t>
             </a:fld>
             <a:endParaRPr lang="ko-KR" altLang="en-US"/>
           </a:p>
@@ -11033,8 +11035,8 @@
           </a:prstGeom>
         </p:spPr>
       </p:pic>
-      <mc:AlternateContent xmlns:mc="http://schemas.openxmlformats.org/markup-compatibility/2006">
-        <mc:Choice xmlns:a14="http://schemas.microsoft.com/office/drawing/2010/main" Requires="a14">
+      <mc:AlternateContent xmlns:mc="http://schemas.openxmlformats.org/markup-compatibility/2006" xmlns:a14="http://schemas.microsoft.com/office/drawing/2010/main">
+        <mc:Choice Requires="a14">
           <p:sp>
             <p:nvSpPr>
               <p:cNvPr id="4" name="TextBox 3">
@@ -11084,7 +11086,7 @@
             </p:txBody>
           </p:sp>
         </mc:Choice>
-        <mc:Fallback>
+        <mc:Fallback xmlns="">
           <p:sp>
             <p:nvSpPr>
               <p:cNvPr id="4" name="TextBox 3">
@@ -11129,8 +11131,8 @@
           </p:sp>
         </mc:Fallback>
       </mc:AlternateContent>
-      <mc:AlternateContent xmlns:mc="http://schemas.openxmlformats.org/markup-compatibility/2006">
-        <mc:Choice xmlns:a14="http://schemas.microsoft.com/office/drawing/2010/main" Requires="a14">
+      <mc:AlternateContent xmlns:mc="http://schemas.openxmlformats.org/markup-compatibility/2006" xmlns:a14="http://schemas.microsoft.com/office/drawing/2010/main">
+        <mc:Choice Requires="a14">
           <p:sp>
             <p:nvSpPr>
               <p:cNvPr id="5" name="TextBox 4">
@@ -11180,7 +11182,7 @@
             </p:txBody>
           </p:sp>
         </mc:Choice>
-        <mc:Fallback>
+        <mc:Fallback xmlns="">
           <p:sp>
             <p:nvSpPr>
               <p:cNvPr id="5" name="TextBox 4">
@@ -11225,8 +11227,8 @@
           </p:sp>
         </mc:Fallback>
       </mc:AlternateContent>
-      <mc:AlternateContent xmlns:mc="http://schemas.openxmlformats.org/markup-compatibility/2006">
-        <mc:Choice xmlns:a14="http://schemas.microsoft.com/office/drawing/2010/main" Requires="a14">
+      <mc:AlternateContent xmlns:mc="http://schemas.openxmlformats.org/markup-compatibility/2006" xmlns:a14="http://schemas.microsoft.com/office/drawing/2010/main">
+        <mc:Choice Requires="a14">
           <p:sp>
             <p:nvSpPr>
               <p:cNvPr id="6" name="TextBox 5">
@@ -11276,7 +11278,7 @@
             </p:txBody>
           </p:sp>
         </mc:Choice>
-        <mc:Fallback>
+        <mc:Fallback xmlns="">
           <p:sp>
             <p:nvSpPr>
               <p:cNvPr id="6" name="TextBox 5">
@@ -11409,8 +11411,8 @@
           </a:fontRef>
         </p:style>
       </p:cxnSp>
-      <mc:AlternateContent xmlns:mc="http://schemas.openxmlformats.org/markup-compatibility/2006">
-        <mc:Choice xmlns:a14="http://schemas.microsoft.com/office/drawing/2010/main" Requires="a14">
+      <mc:AlternateContent xmlns:mc="http://schemas.openxmlformats.org/markup-compatibility/2006" xmlns:a14="http://schemas.microsoft.com/office/drawing/2010/main">
+        <mc:Choice Requires="a14">
           <p:sp>
             <p:nvSpPr>
               <p:cNvPr id="10" name="TextBox 9">
@@ -11460,7 +11462,7 @@
             </p:txBody>
           </p:sp>
         </mc:Choice>
-        <mc:Fallback>
+        <mc:Fallback xmlns="">
           <p:sp>
             <p:nvSpPr>
               <p:cNvPr id="10" name="TextBox 9">
@@ -11505,8 +11507,8 @@
           </p:sp>
         </mc:Fallback>
       </mc:AlternateContent>
-      <mc:AlternateContent xmlns:mc="http://schemas.openxmlformats.org/markup-compatibility/2006">
-        <mc:Choice xmlns:a14="http://schemas.microsoft.com/office/drawing/2010/main" Requires="a14">
+      <mc:AlternateContent xmlns:mc="http://schemas.openxmlformats.org/markup-compatibility/2006" xmlns:a14="http://schemas.microsoft.com/office/drawing/2010/main">
+        <mc:Choice Requires="a14">
           <p:sp>
             <p:nvSpPr>
               <p:cNvPr id="12" name="TextBox 11">
@@ -11556,7 +11558,7 @@
             </p:txBody>
           </p:sp>
         </mc:Choice>
-        <mc:Fallback>
+        <mc:Fallback xmlns="">
           <p:sp>
             <p:nvSpPr>
               <p:cNvPr id="12" name="TextBox 11">
@@ -11601,8 +11603,8 @@
           </p:sp>
         </mc:Fallback>
       </mc:AlternateContent>
-      <mc:AlternateContent xmlns:mc="http://schemas.openxmlformats.org/markup-compatibility/2006">
-        <mc:Choice xmlns:a14="http://schemas.microsoft.com/office/drawing/2010/main" Requires="a14">
+      <mc:AlternateContent xmlns:mc="http://schemas.openxmlformats.org/markup-compatibility/2006" xmlns:a14="http://schemas.microsoft.com/office/drawing/2010/main">
+        <mc:Choice Requires="a14">
           <p:sp>
             <p:nvSpPr>
               <p:cNvPr id="13" name="TextBox 12">
@@ -11652,7 +11654,7 @@
             </p:txBody>
           </p:sp>
         </mc:Choice>
-        <mc:Fallback>
+        <mc:Fallback xmlns="">
           <p:sp>
             <p:nvSpPr>
               <p:cNvPr id="13" name="TextBox 12">
@@ -11835,8 +11837,8 @@
           </a:fontRef>
         </p:style>
       </p:cxnSp>
-      <mc:AlternateContent xmlns:mc="http://schemas.openxmlformats.org/markup-compatibility/2006">
-        <mc:Choice xmlns:a14="http://schemas.microsoft.com/office/drawing/2010/main" Requires="a14">
+      <mc:AlternateContent xmlns:mc="http://schemas.openxmlformats.org/markup-compatibility/2006" xmlns:a14="http://schemas.microsoft.com/office/drawing/2010/main">
+        <mc:Choice Requires="a14">
           <p:sp>
             <p:nvSpPr>
               <p:cNvPr id="19" name="TextBox 18">
@@ -11886,7 +11888,7 @@
             </p:txBody>
           </p:sp>
         </mc:Choice>
-        <mc:Fallback>
+        <mc:Fallback xmlns="">
           <p:sp>
             <p:nvSpPr>
               <p:cNvPr id="19" name="TextBox 18">
@@ -11931,8 +11933,8 @@
           </p:sp>
         </mc:Fallback>
       </mc:AlternateContent>
-      <mc:AlternateContent xmlns:mc="http://schemas.openxmlformats.org/markup-compatibility/2006">
-        <mc:Choice xmlns:a14="http://schemas.microsoft.com/office/drawing/2010/main" Requires="a14">
+      <mc:AlternateContent xmlns:mc="http://schemas.openxmlformats.org/markup-compatibility/2006" xmlns:a14="http://schemas.microsoft.com/office/drawing/2010/main">
+        <mc:Choice Requires="a14">
           <p:sp>
             <p:nvSpPr>
               <p:cNvPr id="21" name="TextBox 20">
@@ -11982,7 +11984,7 @@
             </p:txBody>
           </p:sp>
         </mc:Choice>
-        <mc:Fallback>
+        <mc:Fallback xmlns="">
           <p:sp>
             <p:nvSpPr>
               <p:cNvPr id="21" name="TextBox 20">
@@ -12102,6 +12104,3960 @@
           </a:extLst>
         </p:spPr>
       </p:pic>
+    </p:spTree>
+    <p:extLst>
+      <p:ext uri="{BB962C8B-B14F-4D97-AF65-F5344CB8AC3E}">
+        <p14:creationId xmlns:p14="http://schemas.microsoft.com/office/powerpoint/2010/main" val="168553402"/>
+      </p:ext>
+    </p:extLst>
+  </p:cSld>
+  <p:clrMapOvr>
+    <a:masterClrMapping/>
+  </p:clrMapOvr>
+</p:sld>
+</file>
+
+<file path=ppt/slides/slide15.xml><?xml version="1.0" encoding="utf-8"?>
+<p:sld xmlns:a="http://schemas.openxmlformats.org/drawingml/2006/main" xmlns:r="http://schemas.openxmlformats.org/officeDocument/2006/relationships" xmlns:p="http://schemas.openxmlformats.org/presentationml/2006/main">
+  <p:cSld>
+    <p:spTree>
+      <p:nvGrpSpPr>
+        <p:cNvPr id="1" name=""/>
+        <p:cNvGrpSpPr/>
+        <p:nvPr/>
+      </p:nvGrpSpPr>
+      <p:grpSpPr>
+        <a:xfrm>
+          <a:off x="0" y="0"/>
+          <a:ext cx="0" cy="0"/>
+          <a:chOff x="0" y="0"/>
+          <a:chExt cx="0" cy="0"/>
+        </a:xfrm>
+      </p:grpSpPr>
+      <p:sp>
+        <p:nvSpPr>
+          <p:cNvPr id="26" name="직사각형 25">
+            <a:extLst>
+              <a:ext uri="{FF2B5EF4-FFF2-40B4-BE49-F238E27FC236}">
+                <a16:creationId xmlns:a16="http://schemas.microsoft.com/office/drawing/2014/main" id="{7FD4D76B-9ED5-4C57-91B7-4EAE1FA32EC9}"/>
+              </a:ext>
+            </a:extLst>
+          </p:cNvPr>
+          <p:cNvSpPr/>
+          <p:nvPr/>
+        </p:nvSpPr>
+        <p:spPr>
+          <a:xfrm>
+            <a:off x="-2604304" y="937549"/>
+            <a:ext cx="16758863" cy="5023413"/>
+          </a:xfrm>
+          <a:prstGeom prst="rect">
+            <a:avLst/>
+          </a:prstGeom>
+          <a:solidFill>
+            <a:schemeClr val="bg1"/>
+          </a:solidFill>
+        </p:spPr>
+        <p:style>
+          <a:lnRef idx="2">
+            <a:schemeClr val="accent1">
+              <a:shade val="50000"/>
+            </a:schemeClr>
+          </a:lnRef>
+          <a:fillRef idx="1">
+            <a:schemeClr val="accent1"/>
+          </a:fillRef>
+          <a:effectRef idx="0">
+            <a:schemeClr val="accent1"/>
+          </a:effectRef>
+          <a:fontRef idx="minor">
+            <a:schemeClr val="lt1"/>
+          </a:fontRef>
+        </p:style>
+        <p:txBody>
+          <a:bodyPr rtlCol="0" anchor="ctr"/>
+          <a:lstStyle/>
+          <a:p>
+            <a:pPr algn="ctr"/>
+            <a:endParaRPr lang="ko-KR" altLang="en-US"/>
+          </a:p>
+        </p:txBody>
+      </p:sp>
+      <p:pic>
+        <p:nvPicPr>
+          <p:cNvPr id="3" name="그림 2">
+            <a:extLst>
+              <a:ext uri="{FF2B5EF4-FFF2-40B4-BE49-F238E27FC236}">
+                <a16:creationId xmlns:a16="http://schemas.microsoft.com/office/drawing/2014/main" id="{214DD516-E895-414A-9963-0959BA7933EF}"/>
+              </a:ext>
+            </a:extLst>
+          </p:cNvPr>
+          <p:cNvPicPr>
+            <a:picLocks noChangeAspect="1"/>
+          </p:cNvPicPr>
+          <p:nvPr/>
+        </p:nvPicPr>
+        <p:blipFill>
+          <a:blip r:embed="rId2"/>
+          <a:stretch>
+            <a:fillRect/>
+          </a:stretch>
+        </p:blipFill>
+        <p:spPr>
+          <a:xfrm>
+            <a:off x="-2442961" y="1143000"/>
+            <a:ext cx="4016374" cy="4572000"/>
+          </a:xfrm>
+          <a:prstGeom prst="rect">
+            <a:avLst/>
+          </a:prstGeom>
+        </p:spPr>
+      </p:pic>
+      <mc:AlternateContent xmlns:mc="http://schemas.openxmlformats.org/markup-compatibility/2006">
+        <mc:Choice xmlns:a14="http://schemas.microsoft.com/office/drawing/2010/main" Requires="a14">
+          <p:sp>
+            <p:nvSpPr>
+              <p:cNvPr id="5" name="TextBox 4">
+                <a:extLst>
+                  <a:ext uri="{FF2B5EF4-FFF2-40B4-BE49-F238E27FC236}">
+                    <a16:creationId xmlns:a16="http://schemas.microsoft.com/office/drawing/2014/main" id="{399150E7-52F2-44CE-A245-5E7C6A90ABD6}"/>
+                  </a:ext>
+                </a:extLst>
+              </p:cNvPr>
+              <p:cNvSpPr txBox="1"/>
+              <p:nvPr/>
+            </p:nvSpPr>
+            <p:spPr>
+              <a:xfrm>
+                <a:off x="-911878" y="3439027"/>
+                <a:ext cx="622738" cy="369332"/>
+              </a:xfrm>
+              <a:prstGeom prst="rect">
+                <a:avLst/>
+              </a:prstGeom>
+              <a:noFill/>
+            </p:spPr>
+            <p:txBody>
+              <a:bodyPr wrap="square" rtlCol="0">
+                <a:spAutoFit/>
+              </a:bodyPr>
+              <a:lstStyle/>
+              <a:p>
+                <a:pPr/>
+                <a14:m>
+                  <m:oMathPara xmlns:m="http://schemas.openxmlformats.org/officeDocument/2006/math">
+                    <m:oMathParaPr>
+                      <m:jc m:val="centerGroup"/>
+                    </m:oMathParaPr>
+                    <m:oMath xmlns:m="http://schemas.openxmlformats.org/officeDocument/2006/math">
+                      <m:r>
+                        <a:rPr lang="en-US" altLang="ko-KR" b="0" i="1" smtClean="0">
+                          <a:latin typeface="Cambria Math" panose="02040503050406030204" pitchFamily="18" charset="0"/>
+                        </a:rPr>
+                        <m:t>𝑂</m:t>
+                      </m:r>
+                    </m:oMath>
+                  </m:oMathPara>
+                </a14:m>
+                <a:endParaRPr lang="ko-KR" altLang="en-US" dirty="0"/>
+              </a:p>
+            </p:txBody>
+          </p:sp>
+        </mc:Choice>
+        <mc:Fallback>
+          <p:sp>
+            <p:nvSpPr>
+              <p:cNvPr id="5" name="TextBox 4">
+                <a:extLst>
+                  <a:ext uri="{FF2B5EF4-FFF2-40B4-BE49-F238E27FC236}">
+                    <a16:creationId xmlns:a16="http://schemas.microsoft.com/office/drawing/2014/main" id="{399150E7-52F2-44CE-A245-5E7C6A90ABD6}"/>
+                  </a:ext>
+                </a:extLst>
+              </p:cNvPr>
+              <p:cNvSpPr txBox="1">
+                <a:spLocks noRot="1" noChangeAspect="1" noMove="1" noResize="1" noEditPoints="1" noAdjustHandles="1" noChangeArrowheads="1" noChangeShapeType="1" noTextEdit="1"/>
+              </p:cNvSpPr>
+              <p:nvPr/>
+            </p:nvSpPr>
+            <p:spPr>
+              <a:xfrm>
+                <a:off x="-911878" y="3439027"/>
+                <a:ext cx="622738" cy="369332"/>
+              </a:xfrm>
+              <a:prstGeom prst="rect">
+                <a:avLst/>
+              </a:prstGeom>
+              <a:blipFill>
+                <a:blip r:embed="rId3"/>
+                <a:stretch>
+                  <a:fillRect/>
+                </a:stretch>
+              </a:blipFill>
+            </p:spPr>
+            <p:txBody>
+              <a:bodyPr/>
+              <a:lstStyle/>
+              <a:p>
+                <a:r>
+                  <a:rPr lang="ko-KR" altLang="en-US">
+                    <a:noFill/>
+                  </a:rPr>
+                  <a:t> </a:t>
+                </a:r>
+              </a:p>
+            </p:txBody>
+          </p:sp>
+        </mc:Fallback>
+      </mc:AlternateContent>
+      <mc:AlternateContent xmlns:mc="http://schemas.openxmlformats.org/markup-compatibility/2006">
+        <mc:Choice xmlns:a14="http://schemas.microsoft.com/office/drawing/2010/main" Requires="a14">
+          <p:sp>
+            <p:nvSpPr>
+              <p:cNvPr id="6" name="TextBox 5">
+                <a:extLst>
+                  <a:ext uri="{FF2B5EF4-FFF2-40B4-BE49-F238E27FC236}">
+                    <a16:creationId xmlns:a16="http://schemas.microsoft.com/office/drawing/2014/main" id="{CDD7B929-619A-4731-86FC-D97294C08AB1}"/>
+                  </a:ext>
+                </a:extLst>
+              </p:cNvPr>
+              <p:cNvSpPr txBox="1"/>
+              <p:nvPr/>
+            </p:nvSpPr>
+            <p:spPr>
+              <a:xfrm>
+                <a:off x="1171023" y="3429000"/>
+                <a:ext cx="622738" cy="369332"/>
+              </a:xfrm>
+              <a:prstGeom prst="rect">
+                <a:avLst/>
+              </a:prstGeom>
+              <a:noFill/>
+            </p:spPr>
+            <p:txBody>
+              <a:bodyPr wrap="square" rtlCol="0">
+                <a:spAutoFit/>
+              </a:bodyPr>
+              <a:lstStyle/>
+              <a:p>
+                <a:pPr/>
+                <a14:m>
+                  <m:oMathPara xmlns:m="http://schemas.openxmlformats.org/officeDocument/2006/math">
+                    <m:oMathParaPr>
+                      <m:jc m:val="centerGroup"/>
+                    </m:oMathParaPr>
+                    <m:oMath xmlns:m="http://schemas.openxmlformats.org/officeDocument/2006/math">
+                      <m:r>
+                        <a:rPr lang="en-US" altLang="ko-KR" b="0" i="1" smtClean="0">
+                          <a:latin typeface="Cambria Math" panose="02040503050406030204" pitchFamily="18" charset="0"/>
+                        </a:rPr>
+                        <m:t>𝑥</m:t>
+                      </m:r>
+                    </m:oMath>
+                  </m:oMathPara>
+                </a14:m>
+                <a:endParaRPr lang="ko-KR" altLang="en-US" dirty="0"/>
+              </a:p>
+            </p:txBody>
+          </p:sp>
+        </mc:Choice>
+        <mc:Fallback>
+          <p:sp>
+            <p:nvSpPr>
+              <p:cNvPr id="6" name="TextBox 5">
+                <a:extLst>
+                  <a:ext uri="{FF2B5EF4-FFF2-40B4-BE49-F238E27FC236}">
+                    <a16:creationId xmlns:a16="http://schemas.microsoft.com/office/drawing/2014/main" id="{CDD7B929-619A-4731-86FC-D97294C08AB1}"/>
+                  </a:ext>
+                </a:extLst>
+              </p:cNvPr>
+              <p:cNvSpPr txBox="1">
+                <a:spLocks noRot="1" noChangeAspect="1" noMove="1" noResize="1" noEditPoints="1" noAdjustHandles="1" noChangeArrowheads="1" noChangeShapeType="1" noTextEdit="1"/>
+              </p:cNvSpPr>
+              <p:nvPr/>
+            </p:nvSpPr>
+            <p:spPr>
+              <a:xfrm>
+                <a:off x="1171023" y="3429000"/>
+                <a:ext cx="622738" cy="369332"/>
+              </a:xfrm>
+              <a:prstGeom prst="rect">
+                <a:avLst/>
+              </a:prstGeom>
+              <a:blipFill>
+                <a:blip r:embed="rId4"/>
+                <a:stretch>
+                  <a:fillRect/>
+                </a:stretch>
+              </a:blipFill>
+            </p:spPr>
+            <p:txBody>
+              <a:bodyPr/>
+              <a:lstStyle/>
+              <a:p>
+                <a:r>
+                  <a:rPr lang="ko-KR" altLang="en-US">
+                    <a:noFill/>
+                  </a:rPr>
+                  <a:t> </a:t>
+                </a:r>
+              </a:p>
+            </p:txBody>
+          </p:sp>
+        </mc:Fallback>
+      </mc:AlternateContent>
+      <mc:AlternateContent xmlns:mc="http://schemas.openxmlformats.org/markup-compatibility/2006">
+        <mc:Choice xmlns:a14="http://schemas.microsoft.com/office/drawing/2010/main" Requires="a14">
+          <p:sp>
+            <p:nvSpPr>
+              <p:cNvPr id="7" name="TextBox 6">
+                <a:extLst>
+                  <a:ext uri="{FF2B5EF4-FFF2-40B4-BE49-F238E27FC236}">
+                    <a16:creationId xmlns:a16="http://schemas.microsoft.com/office/drawing/2014/main" id="{3579F2AB-EDA7-4E15-A015-3031767F5DE6}"/>
+                  </a:ext>
+                </a:extLst>
+              </p:cNvPr>
+              <p:cNvSpPr txBox="1"/>
+              <p:nvPr/>
+            </p:nvSpPr>
+            <p:spPr>
+              <a:xfrm>
+                <a:off x="-911878" y="998929"/>
+                <a:ext cx="622738" cy="369332"/>
+              </a:xfrm>
+              <a:prstGeom prst="rect">
+                <a:avLst/>
+              </a:prstGeom>
+              <a:noFill/>
+            </p:spPr>
+            <p:txBody>
+              <a:bodyPr wrap="square" rtlCol="0">
+                <a:spAutoFit/>
+              </a:bodyPr>
+              <a:lstStyle/>
+              <a:p>
+                <a:pPr/>
+                <a14:m>
+                  <m:oMathPara xmlns:m="http://schemas.openxmlformats.org/officeDocument/2006/math">
+                    <m:oMathParaPr>
+                      <m:jc m:val="centerGroup"/>
+                    </m:oMathParaPr>
+                    <m:oMath xmlns:m="http://schemas.openxmlformats.org/officeDocument/2006/math">
+                      <m:r>
+                        <a:rPr lang="en-US" altLang="ko-KR" b="0" i="1" smtClean="0">
+                          <a:latin typeface="Cambria Math" panose="02040503050406030204" pitchFamily="18" charset="0"/>
+                        </a:rPr>
+                        <m:t>𝑦</m:t>
+                      </m:r>
+                    </m:oMath>
+                  </m:oMathPara>
+                </a14:m>
+                <a:endParaRPr lang="ko-KR" altLang="en-US" dirty="0"/>
+              </a:p>
+            </p:txBody>
+          </p:sp>
+        </mc:Choice>
+        <mc:Fallback>
+          <p:sp>
+            <p:nvSpPr>
+              <p:cNvPr id="7" name="TextBox 6">
+                <a:extLst>
+                  <a:ext uri="{FF2B5EF4-FFF2-40B4-BE49-F238E27FC236}">
+                    <a16:creationId xmlns:a16="http://schemas.microsoft.com/office/drawing/2014/main" id="{3579F2AB-EDA7-4E15-A015-3031767F5DE6}"/>
+                  </a:ext>
+                </a:extLst>
+              </p:cNvPr>
+              <p:cNvSpPr txBox="1">
+                <a:spLocks noRot="1" noChangeAspect="1" noMove="1" noResize="1" noEditPoints="1" noAdjustHandles="1" noChangeArrowheads="1" noChangeShapeType="1" noTextEdit="1"/>
+              </p:cNvSpPr>
+              <p:nvPr/>
+            </p:nvSpPr>
+            <p:spPr>
+              <a:xfrm>
+                <a:off x="-911878" y="998929"/>
+                <a:ext cx="622738" cy="369332"/>
+              </a:xfrm>
+              <a:prstGeom prst="rect">
+                <a:avLst/>
+              </a:prstGeom>
+              <a:blipFill>
+                <a:blip r:embed="rId5"/>
+                <a:stretch>
+                  <a:fillRect b="-10000"/>
+                </a:stretch>
+              </a:blipFill>
+            </p:spPr>
+            <p:txBody>
+              <a:bodyPr/>
+              <a:lstStyle/>
+              <a:p>
+                <a:r>
+                  <a:rPr lang="ko-KR" altLang="en-US">
+                    <a:noFill/>
+                  </a:rPr>
+                  <a:t> </a:t>
+                </a:r>
+              </a:p>
+            </p:txBody>
+          </p:sp>
+        </mc:Fallback>
+      </mc:AlternateContent>
+      <mc:AlternateContent xmlns:mc="http://schemas.openxmlformats.org/markup-compatibility/2006">
+        <mc:Choice xmlns:a14="http://schemas.microsoft.com/office/drawing/2010/main" Requires="a14">
+          <p:sp>
+            <p:nvSpPr>
+              <p:cNvPr id="8" name="TextBox 7">
+                <a:extLst>
+                  <a:ext uri="{FF2B5EF4-FFF2-40B4-BE49-F238E27FC236}">
+                    <a16:creationId xmlns:a16="http://schemas.microsoft.com/office/drawing/2014/main" id="{4165D3DB-6E81-48D7-AD70-01F415B972CB}"/>
+                  </a:ext>
+                </a:extLst>
+              </p:cNvPr>
+              <p:cNvSpPr txBox="1"/>
+              <p:nvPr/>
+            </p:nvSpPr>
+            <p:spPr>
+              <a:xfrm>
+                <a:off x="173972" y="2004769"/>
+                <a:ext cx="1300064" cy="369332"/>
+              </a:xfrm>
+              <a:prstGeom prst="rect">
+                <a:avLst/>
+              </a:prstGeom>
+              <a:noFill/>
+            </p:spPr>
+            <p:txBody>
+              <a:bodyPr wrap="square" rtlCol="0">
+                <a:spAutoFit/>
+              </a:bodyPr>
+              <a:lstStyle/>
+              <a:p>
+                <a:pPr/>
+                <a14:m>
+                  <m:oMathPara xmlns:m="http://schemas.openxmlformats.org/officeDocument/2006/math">
+                    <m:oMathParaPr>
+                      <m:jc m:val="centerGroup"/>
+                    </m:oMathParaPr>
+                    <m:oMath xmlns:m="http://schemas.openxmlformats.org/officeDocument/2006/math">
+                      <m:r>
+                        <a:rPr lang="en-US" altLang="ko-KR" b="0" i="1" smtClean="0">
+                          <a:latin typeface="Cambria Math" panose="02040503050406030204" pitchFamily="18" charset="0"/>
+                        </a:rPr>
+                        <m:t>𝑦</m:t>
+                      </m:r>
+                      <m:r>
+                        <a:rPr lang="en-US" altLang="ko-KR" b="0" i="1" smtClean="0">
+                          <a:latin typeface="Cambria Math" panose="02040503050406030204" pitchFamily="18" charset="0"/>
+                        </a:rPr>
+                        <m:t>=</m:t>
+                      </m:r>
+                      <m:sSup>
+                        <m:sSupPr>
+                          <m:ctrlPr>
+                            <a:rPr lang="en-US" altLang="ko-KR" b="0" i="1" smtClean="0">
+                              <a:latin typeface="Cambria Math" panose="02040503050406030204" pitchFamily="18" charset="0"/>
+                            </a:rPr>
+                          </m:ctrlPr>
+                        </m:sSupPr>
+                        <m:e>
+                          <m:r>
+                            <a:rPr lang="en-US" altLang="ko-KR" b="0" i="1" smtClean="0">
+                              <a:latin typeface="Cambria Math" panose="02040503050406030204" pitchFamily="18" charset="0"/>
+                            </a:rPr>
+                            <m:t>𝑥</m:t>
+                          </m:r>
+                        </m:e>
+                        <m:sup>
+                          <m:r>
+                            <a:rPr lang="en-US" altLang="ko-KR" b="0" i="1" smtClean="0">
+                              <a:latin typeface="Cambria Math" panose="02040503050406030204" pitchFamily="18" charset="0"/>
+                            </a:rPr>
+                            <m:t>2</m:t>
+                          </m:r>
+                        </m:sup>
+                      </m:sSup>
+                      <m:r>
+                        <a:rPr lang="en-US" altLang="ko-KR" b="0" i="1" smtClean="0">
+                          <a:latin typeface="Cambria Math" panose="02040503050406030204" pitchFamily="18" charset="0"/>
+                        </a:rPr>
+                        <m:t>+</m:t>
+                      </m:r>
+                      <m:r>
+                        <a:rPr lang="en-US" altLang="ko-KR" b="0" i="1" smtClean="0">
+                          <a:latin typeface="Cambria Math" panose="02040503050406030204" pitchFamily="18" charset="0"/>
+                        </a:rPr>
+                        <m:t>𝑐</m:t>
+                      </m:r>
+                    </m:oMath>
+                  </m:oMathPara>
+                </a14:m>
+                <a:endParaRPr lang="ko-KR" altLang="en-US" dirty="0"/>
+              </a:p>
+            </p:txBody>
+          </p:sp>
+        </mc:Choice>
+        <mc:Fallback>
+          <p:sp>
+            <p:nvSpPr>
+              <p:cNvPr id="8" name="TextBox 7">
+                <a:extLst>
+                  <a:ext uri="{FF2B5EF4-FFF2-40B4-BE49-F238E27FC236}">
+                    <a16:creationId xmlns:a16="http://schemas.microsoft.com/office/drawing/2014/main" id="{4165D3DB-6E81-48D7-AD70-01F415B972CB}"/>
+                  </a:ext>
+                </a:extLst>
+              </p:cNvPr>
+              <p:cNvSpPr txBox="1">
+                <a:spLocks noRot="1" noChangeAspect="1" noMove="1" noResize="1" noEditPoints="1" noAdjustHandles="1" noChangeArrowheads="1" noChangeShapeType="1" noTextEdit="1"/>
+              </p:cNvSpPr>
+              <p:nvPr/>
+            </p:nvSpPr>
+            <p:spPr>
+              <a:xfrm>
+                <a:off x="173972" y="2004769"/>
+                <a:ext cx="1300064" cy="369332"/>
+              </a:xfrm>
+              <a:prstGeom prst="rect">
+                <a:avLst/>
+              </a:prstGeom>
+              <a:blipFill>
+                <a:blip r:embed="rId6"/>
+                <a:stretch>
+                  <a:fillRect b="-10000"/>
+                </a:stretch>
+              </a:blipFill>
+            </p:spPr>
+            <p:txBody>
+              <a:bodyPr/>
+              <a:lstStyle/>
+              <a:p>
+                <a:r>
+                  <a:rPr lang="ko-KR" altLang="en-US">
+                    <a:noFill/>
+                  </a:rPr>
+                  <a:t> </a:t>
+                </a:r>
+              </a:p>
+            </p:txBody>
+          </p:sp>
+        </mc:Fallback>
+      </mc:AlternateContent>
+      <p:cxnSp>
+        <p:nvCxnSpPr>
+          <p:cNvPr id="9" name="직선 화살표 연결선 8">
+            <a:extLst>
+              <a:ext uri="{FF2B5EF4-FFF2-40B4-BE49-F238E27FC236}">
+                <a16:creationId xmlns:a16="http://schemas.microsoft.com/office/drawing/2014/main" id="{9720794B-DAE4-4296-8B01-26A94E65D443}"/>
+              </a:ext>
+            </a:extLst>
+          </p:cNvPr>
+          <p:cNvCxnSpPr/>
+          <p:nvPr/>
+        </p:nvCxnSpPr>
+        <p:spPr>
+          <a:xfrm>
+            <a:off x="-450014" y="2506980"/>
+            <a:ext cx="0" cy="1767840"/>
+          </a:xfrm>
+          <a:prstGeom prst="straightConnector1">
+            <a:avLst/>
+          </a:prstGeom>
+          <a:ln w="38100">
+            <a:solidFill>
+              <a:srgbClr val="FF0000"/>
+            </a:solidFill>
+            <a:headEnd type="triangle"/>
+            <a:tailEnd type="triangle"/>
+          </a:ln>
+        </p:spPr>
+        <p:style>
+          <a:lnRef idx="1">
+            <a:schemeClr val="accent1"/>
+          </a:lnRef>
+          <a:fillRef idx="0">
+            <a:schemeClr val="accent1"/>
+          </a:fillRef>
+          <a:effectRef idx="0">
+            <a:schemeClr val="accent1"/>
+          </a:effectRef>
+          <a:fontRef idx="minor">
+            <a:schemeClr val="tx1"/>
+          </a:fontRef>
+        </p:style>
+      </p:cxnSp>
+      <p:pic>
+        <p:nvPicPr>
+          <p:cNvPr id="11" name="그림 10">
+            <a:extLst>
+              <a:ext uri="{FF2B5EF4-FFF2-40B4-BE49-F238E27FC236}">
+                <a16:creationId xmlns:a16="http://schemas.microsoft.com/office/drawing/2014/main" id="{AAA64B4B-22DE-48FA-86A2-F5D29FEA028F}"/>
+              </a:ext>
+            </a:extLst>
+          </p:cNvPr>
+          <p:cNvPicPr>
+            <a:picLocks noChangeAspect="1"/>
+          </p:cNvPicPr>
+          <p:nvPr/>
+        </p:nvPicPr>
+        <p:blipFill>
+          <a:blip r:embed="rId2"/>
+          <a:stretch>
+            <a:fillRect/>
+          </a:stretch>
+        </p:blipFill>
+        <p:spPr>
+          <a:xfrm>
+            <a:off x="1703807" y="1143000"/>
+            <a:ext cx="4016374" cy="4572000"/>
+          </a:xfrm>
+          <a:prstGeom prst="rect">
+            <a:avLst/>
+          </a:prstGeom>
+        </p:spPr>
+      </p:pic>
+      <mc:AlternateContent xmlns:mc="http://schemas.openxmlformats.org/markup-compatibility/2006">
+        <mc:Choice xmlns:a14="http://schemas.microsoft.com/office/drawing/2010/main" Requires="a14">
+          <p:sp>
+            <p:nvSpPr>
+              <p:cNvPr id="12" name="TextBox 11">
+                <a:extLst>
+                  <a:ext uri="{FF2B5EF4-FFF2-40B4-BE49-F238E27FC236}">
+                    <a16:creationId xmlns:a16="http://schemas.microsoft.com/office/drawing/2014/main" id="{08092FA1-3374-4ED3-B9F4-25B1EB60894C}"/>
+                  </a:ext>
+                </a:extLst>
+              </p:cNvPr>
+              <p:cNvSpPr txBox="1"/>
+              <p:nvPr/>
+            </p:nvSpPr>
+            <p:spPr>
+              <a:xfrm>
+                <a:off x="3234890" y="3439027"/>
+                <a:ext cx="622738" cy="369332"/>
+              </a:xfrm>
+              <a:prstGeom prst="rect">
+                <a:avLst/>
+              </a:prstGeom>
+              <a:noFill/>
+            </p:spPr>
+            <p:txBody>
+              <a:bodyPr wrap="square" rtlCol="0">
+                <a:spAutoFit/>
+              </a:bodyPr>
+              <a:lstStyle/>
+              <a:p>
+                <a:pPr/>
+                <a14:m>
+                  <m:oMathPara xmlns:m="http://schemas.openxmlformats.org/officeDocument/2006/math">
+                    <m:oMathParaPr>
+                      <m:jc m:val="centerGroup"/>
+                    </m:oMathParaPr>
+                    <m:oMath xmlns:m="http://schemas.openxmlformats.org/officeDocument/2006/math">
+                      <m:r>
+                        <a:rPr lang="en-US" altLang="ko-KR" b="0" i="1" smtClean="0">
+                          <a:latin typeface="Cambria Math" panose="02040503050406030204" pitchFamily="18" charset="0"/>
+                        </a:rPr>
+                        <m:t>𝑂</m:t>
+                      </m:r>
+                    </m:oMath>
+                  </m:oMathPara>
+                </a14:m>
+                <a:endParaRPr lang="ko-KR" altLang="en-US" dirty="0"/>
+              </a:p>
+            </p:txBody>
+          </p:sp>
+        </mc:Choice>
+        <mc:Fallback>
+          <p:sp>
+            <p:nvSpPr>
+              <p:cNvPr id="12" name="TextBox 11">
+                <a:extLst>
+                  <a:ext uri="{FF2B5EF4-FFF2-40B4-BE49-F238E27FC236}">
+                    <a16:creationId xmlns:a16="http://schemas.microsoft.com/office/drawing/2014/main" id="{08092FA1-3374-4ED3-B9F4-25B1EB60894C}"/>
+                  </a:ext>
+                </a:extLst>
+              </p:cNvPr>
+              <p:cNvSpPr txBox="1">
+                <a:spLocks noRot="1" noChangeAspect="1" noMove="1" noResize="1" noEditPoints="1" noAdjustHandles="1" noChangeArrowheads="1" noChangeShapeType="1" noTextEdit="1"/>
+              </p:cNvSpPr>
+              <p:nvPr/>
+            </p:nvSpPr>
+            <p:spPr>
+              <a:xfrm>
+                <a:off x="3234890" y="3439027"/>
+                <a:ext cx="622738" cy="369332"/>
+              </a:xfrm>
+              <a:prstGeom prst="rect">
+                <a:avLst/>
+              </a:prstGeom>
+              <a:blipFill>
+                <a:blip r:embed="rId7"/>
+                <a:stretch>
+                  <a:fillRect/>
+                </a:stretch>
+              </a:blipFill>
+            </p:spPr>
+            <p:txBody>
+              <a:bodyPr/>
+              <a:lstStyle/>
+              <a:p>
+                <a:r>
+                  <a:rPr lang="ko-KR" altLang="en-US">
+                    <a:noFill/>
+                  </a:rPr>
+                  <a:t> </a:t>
+                </a:r>
+              </a:p>
+            </p:txBody>
+          </p:sp>
+        </mc:Fallback>
+      </mc:AlternateContent>
+      <mc:AlternateContent xmlns:mc="http://schemas.openxmlformats.org/markup-compatibility/2006">
+        <mc:Choice xmlns:a14="http://schemas.microsoft.com/office/drawing/2010/main" Requires="a14">
+          <p:sp>
+            <p:nvSpPr>
+              <p:cNvPr id="13" name="TextBox 12">
+                <a:extLst>
+                  <a:ext uri="{FF2B5EF4-FFF2-40B4-BE49-F238E27FC236}">
+                    <a16:creationId xmlns:a16="http://schemas.microsoft.com/office/drawing/2014/main" id="{ECCF2A1C-53F8-4F17-A5C5-448DED96BA2E}"/>
+                  </a:ext>
+                </a:extLst>
+              </p:cNvPr>
+              <p:cNvSpPr txBox="1"/>
+              <p:nvPr/>
+            </p:nvSpPr>
+            <p:spPr>
+              <a:xfrm>
+                <a:off x="5317791" y="3429000"/>
+                <a:ext cx="622738" cy="369332"/>
+              </a:xfrm>
+              <a:prstGeom prst="rect">
+                <a:avLst/>
+              </a:prstGeom>
+              <a:noFill/>
+            </p:spPr>
+            <p:txBody>
+              <a:bodyPr wrap="square" rtlCol="0">
+                <a:spAutoFit/>
+              </a:bodyPr>
+              <a:lstStyle/>
+              <a:p>
+                <a:pPr/>
+                <a14:m>
+                  <m:oMathPara xmlns:m="http://schemas.openxmlformats.org/officeDocument/2006/math">
+                    <m:oMathParaPr>
+                      <m:jc m:val="centerGroup"/>
+                    </m:oMathParaPr>
+                    <m:oMath xmlns:m="http://schemas.openxmlformats.org/officeDocument/2006/math">
+                      <m:r>
+                        <a:rPr lang="en-US" altLang="ko-KR" b="0" i="1" smtClean="0">
+                          <a:latin typeface="Cambria Math" panose="02040503050406030204" pitchFamily="18" charset="0"/>
+                        </a:rPr>
+                        <m:t>𝑥</m:t>
+                      </m:r>
+                    </m:oMath>
+                  </m:oMathPara>
+                </a14:m>
+                <a:endParaRPr lang="ko-KR" altLang="en-US" dirty="0"/>
+              </a:p>
+            </p:txBody>
+          </p:sp>
+        </mc:Choice>
+        <mc:Fallback>
+          <p:sp>
+            <p:nvSpPr>
+              <p:cNvPr id="13" name="TextBox 12">
+                <a:extLst>
+                  <a:ext uri="{FF2B5EF4-FFF2-40B4-BE49-F238E27FC236}">
+                    <a16:creationId xmlns:a16="http://schemas.microsoft.com/office/drawing/2014/main" id="{ECCF2A1C-53F8-4F17-A5C5-448DED96BA2E}"/>
+                  </a:ext>
+                </a:extLst>
+              </p:cNvPr>
+              <p:cNvSpPr txBox="1">
+                <a:spLocks noRot="1" noChangeAspect="1" noMove="1" noResize="1" noEditPoints="1" noAdjustHandles="1" noChangeArrowheads="1" noChangeShapeType="1" noTextEdit="1"/>
+              </p:cNvSpPr>
+              <p:nvPr/>
+            </p:nvSpPr>
+            <p:spPr>
+              <a:xfrm>
+                <a:off x="5317791" y="3429000"/>
+                <a:ext cx="622738" cy="369332"/>
+              </a:xfrm>
+              <a:prstGeom prst="rect">
+                <a:avLst/>
+              </a:prstGeom>
+              <a:blipFill>
+                <a:blip r:embed="rId8"/>
+                <a:stretch>
+                  <a:fillRect/>
+                </a:stretch>
+              </a:blipFill>
+            </p:spPr>
+            <p:txBody>
+              <a:bodyPr/>
+              <a:lstStyle/>
+              <a:p>
+                <a:r>
+                  <a:rPr lang="ko-KR" altLang="en-US">
+                    <a:noFill/>
+                  </a:rPr>
+                  <a:t> </a:t>
+                </a:r>
+              </a:p>
+            </p:txBody>
+          </p:sp>
+        </mc:Fallback>
+      </mc:AlternateContent>
+      <mc:AlternateContent xmlns:mc="http://schemas.openxmlformats.org/markup-compatibility/2006">
+        <mc:Choice xmlns:a14="http://schemas.microsoft.com/office/drawing/2010/main" Requires="a14">
+          <p:sp>
+            <p:nvSpPr>
+              <p:cNvPr id="14" name="TextBox 13">
+                <a:extLst>
+                  <a:ext uri="{FF2B5EF4-FFF2-40B4-BE49-F238E27FC236}">
+                    <a16:creationId xmlns:a16="http://schemas.microsoft.com/office/drawing/2014/main" id="{F5D399DD-6EF2-4636-84BB-E99EEE923B68}"/>
+                  </a:ext>
+                </a:extLst>
+              </p:cNvPr>
+              <p:cNvSpPr txBox="1"/>
+              <p:nvPr/>
+            </p:nvSpPr>
+            <p:spPr>
+              <a:xfrm>
+                <a:off x="3234890" y="998929"/>
+                <a:ext cx="622738" cy="369332"/>
+              </a:xfrm>
+              <a:prstGeom prst="rect">
+                <a:avLst/>
+              </a:prstGeom>
+              <a:noFill/>
+            </p:spPr>
+            <p:txBody>
+              <a:bodyPr wrap="square" rtlCol="0">
+                <a:spAutoFit/>
+              </a:bodyPr>
+              <a:lstStyle/>
+              <a:p>
+                <a:pPr/>
+                <a14:m>
+                  <m:oMathPara xmlns:m="http://schemas.openxmlformats.org/officeDocument/2006/math">
+                    <m:oMathParaPr>
+                      <m:jc m:val="centerGroup"/>
+                    </m:oMathParaPr>
+                    <m:oMath xmlns:m="http://schemas.openxmlformats.org/officeDocument/2006/math">
+                      <m:r>
+                        <a:rPr lang="en-US" altLang="ko-KR" b="0" i="1" smtClean="0">
+                          <a:latin typeface="Cambria Math" panose="02040503050406030204" pitchFamily="18" charset="0"/>
+                        </a:rPr>
+                        <m:t>𝑦</m:t>
+                      </m:r>
+                    </m:oMath>
+                  </m:oMathPara>
+                </a14:m>
+                <a:endParaRPr lang="ko-KR" altLang="en-US" dirty="0"/>
+              </a:p>
+            </p:txBody>
+          </p:sp>
+        </mc:Choice>
+        <mc:Fallback>
+          <p:sp>
+            <p:nvSpPr>
+              <p:cNvPr id="14" name="TextBox 13">
+                <a:extLst>
+                  <a:ext uri="{FF2B5EF4-FFF2-40B4-BE49-F238E27FC236}">
+                    <a16:creationId xmlns:a16="http://schemas.microsoft.com/office/drawing/2014/main" id="{F5D399DD-6EF2-4636-84BB-E99EEE923B68}"/>
+                  </a:ext>
+                </a:extLst>
+              </p:cNvPr>
+              <p:cNvSpPr txBox="1">
+                <a:spLocks noRot="1" noChangeAspect="1" noMove="1" noResize="1" noEditPoints="1" noAdjustHandles="1" noChangeArrowheads="1" noChangeShapeType="1" noTextEdit="1"/>
+              </p:cNvSpPr>
+              <p:nvPr/>
+            </p:nvSpPr>
+            <p:spPr>
+              <a:xfrm>
+                <a:off x="3234890" y="998929"/>
+                <a:ext cx="622738" cy="369332"/>
+              </a:xfrm>
+              <a:prstGeom prst="rect">
+                <a:avLst/>
+              </a:prstGeom>
+              <a:blipFill>
+                <a:blip r:embed="rId9"/>
+                <a:stretch>
+                  <a:fillRect b="-10000"/>
+                </a:stretch>
+              </a:blipFill>
+            </p:spPr>
+            <p:txBody>
+              <a:bodyPr/>
+              <a:lstStyle/>
+              <a:p>
+                <a:r>
+                  <a:rPr lang="ko-KR" altLang="en-US">
+                    <a:noFill/>
+                  </a:rPr>
+                  <a:t> </a:t>
+                </a:r>
+              </a:p>
+            </p:txBody>
+          </p:sp>
+        </mc:Fallback>
+      </mc:AlternateContent>
+      <mc:AlternateContent xmlns:mc="http://schemas.openxmlformats.org/markup-compatibility/2006">
+        <mc:Choice xmlns:a14="http://schemas.microsoft.com/office/drawing/2010/main" Requires="a14">
+          <p:sp>
+            <p:nvSpPr>
+              <p:cNvPr id="15" name="TextBox 14">
+                <a:extLst>
+                  <a:ext uri="{FF2B5EF4-FFF2-40B4-BE49-F238E27FC236}">
+                    <a16:creationId xmlns:a16="http://schemas.microsoft.com/office/drawing/2014/main" id="{A4372CD6-081D-48E6-9DBA-2CA33F556175}"/>
+                  </a:ext>
+                </a:extLst>
+              </p:cNvPr>
+              <p:cNvSpPr txBox="1"/>
+              <p:nvPr/>
+            </p:nvSpPr>
+            <p:spPr>
+              <a:xfrm>
+                <a:off x="4162208" y="2004769"/>
+                <a:ext cx="1617128" cy="646331"/>
+              </a:xfrm>
+              <a:prstGeom prst="rect">
+                <a:avLst/>
+              </a:prstGeom>
+              <a:noFill/>
+            </p:spPr>
+            <p:txBody>
+              <a:bodyPr wrap="square" rtlCol="0">
+                <a:spAutoFit/>
+              </a:bodyPr>
+              <a:lstStyle/>
+              <a:p>
+                <a:pPr/>
+                <a14:m>
+                  <m:oMathPara xmlns:m="http://schemas.openxmlformats.org/officeDocument/2006/math">
+                    <m:oMathParaPr>
+                      <m:jc m:val="centerGroup"/>
+                    </m:oMathParaPr>
+                    <m:oMath xmlns:m="http://schemas.openxmlformats.org/officeDocument/2006/math">
+                      <m:r>
+                        <a:rPr lang="en-US" altLang="ko-KR" b="0" i="1" smtClean="0">
+                          <a:latin typeface="Cambria Math" panose="02040503050406030204" pitchFamily="18" charset="0"/>
+                        </a:rPr>
+                        <m:t>𝑦</m:t>
+                      </m:r>
+                      <m:r>
+                        <a:rPr lang="en-US" altLang="ko-KR" b="0" i="1" smtClean="0">
+                          <a:latin typeface="Cambria Math" panose="02040503050406030204" pitchFamily="18" charset="0"/>
+                        </a:rPr>
+                        <m:t>=</m:t>
+                      </m:r>
+                      <m:sSup>
+                        <m:sSupPr>
+                          <m:ctrlPr>
+                            <a:rPr lang="en-US" altLang="ko-KR" b="0" i="1" smtClean="0">
+                              <a:latin typeface="Cambria Math" panose="02040503050406030204" pitchFamily="18" charset="0"/>
+                            </a:rPr>
+                          </m:ctrlPr>
+                        </m:sSupPr>
+                        <m:e>
+                          <m:r>
+                            <a:rPr lang="en-US" altLang="ko-KR" b="0" i="1" smtClean="0">
+                              <a:latin typeface="Cambria Math" panose="02040503050406030204" pitchFamily="18" charset="0"/>
+                            </a:rPr>
+                            <m:t>𝑎𝑥</m:t>
+                          </m:r>
+                        </m:e>
+                        <m:sup>
+                          <m:r>
+                            <a:rPr lang="en-US" altLang="ko-KR" b="0" i="1" smtClean="0">
+                              <a:latin typeface="Cambria Math" panose="02040503050406030204" pitchFamily="18" charset="0"/>
+                            </a:rPr>
+                            <m:t>2</m:t>
+                          </m:r>
+                        </m:sup>
+                      </m:sSup>
+                      <m:r>
+                        <a:rPr lang="en-US" altLang="ko-KR" b="0" i="1" smtClean="0">
+                          <a:latin typeface="Cambria Math" panose="02040503050406030204" pitchFamily="18" charset="0"/>
+                        </a:rPr>
+                        <m:t>+</m:t>
+                      </m:r>
+                      <m:r>
+                        <a:rPr lang="en-US" altLang="ko-KR" b="0" i="1" smtClean="0">
+                          <a:latin typeface="Cambria Math" panose="02040503050406030204" pitchFamily="18" charset="0"/>
+                        </a:rPr>
+                        <m:t>𝑐</m:t>
+                      </m:r>
+                    </m:oMath>
+                  </m:oMathPara>
+                </a14:m>
+                <a:endParaRPr lang="en-US" altLang="ko-KR" dirty="0"/>
+              </a:p>
+              <a:p>
+                <a14:m>
+                  <m:oMathPara xmlns:m="http://schemas.openxmlformats.org/officeDocument/2006/math">
+                    <m:oMathParaPr>
+                      <m:jc m:val="centerGroup"/>
+                    </m:oMathParaPr>
+                    <m:oMath xmlns:m="http://schemas.openxmlformats.org/officeDocument/2006/math">
+                      <m:r>
+                        <a:rPr lang="en-US" altLang="ko-KR" i="1">
+                          <a:latin typeface="Cambria Math" panose="02040503050406030204" pitchFamily="18" charset="0"/>
+                        </a:rPr>
+                        <m:t>𝑎</m:t>
+                      </m:r>
+                      <m:r>
+                        <a:rPr lang="en-US" altLang="ko-KR" b="0" i="1" smtClean="0">
+                          <a:latin typeface="Cambria Math" panose="02040503050406030204" pitchFamily="18" charset="0"/>
+                        </a:rPr>
+                        <m:t>&gt;</m:t>
+                      </m:r>
+                      <m:r>
+                        <a:rPr lang="en-US" altLang="ko-KR" i="1">
+                          <a:latin typeface="Cambria Math" panose="02040503050406030204" pitchFamily="18" charset="0"/>
+                        </a:rPr>
+                        <m:t>0</m:t>
+                      </m:r>
+                    </m:oMath>
+                  </m:oMathPara>
+                </a14:m>
+                <a:endParaRPr lang="ko-KR" altLang="en-US" dirty="0"/>
+              </a:p>
+            </p:txBody>
+          </p:sp>
+        </mc:Choice>
+        <mc:Fallback>
+          <p:sp>
+            <p:nvSpPr>
+              <p:cNvPr id="15" name="TextBox 14">
+                <a:extLst>
+                  <a:ext uri="{FF2B5EF4-FFF2-40B4-BE49-F238E27FC236}">
+                    <a16:creationId xmlns:a16="http://schemas.microsoft.com/office/drawing/2014/main" id="{A4372CD6-081D-48E6-9DBA-2CA33F556175}"/>
+                  </a:ext>
+                </a:extLst>
+              </p:cNvPr>
+              <p:cNvSpPr txBox="1">
+                <a:spLocks noRot="1" noChangeAspect="1" noMove="1" noResize="1" noEditPoints="1" noAdjustHandles="1" noChangeArrowheads="1" noChangeShapeType="1" noTextEdit="1"/>
+              </p:cNvSpPr>
+              <p:nvPr/>
+            </p:nvSpPr>
+            <p:spPr>
+              <a:xfrm>
+                <a:off x="4162208" y="2004769"/>
+                <a:ext cx="1617128" cy="646331"/>
+              </a:xfrm>
+              <a:prstGeom prst="rect">
+                <a:avLst/>
+              </a:prstGeom>
+              <a:blipFill>
+                <a:blip r:embed="rId10"/>
+                <a:stretch>
+                  <a:fillRect/>
+                </a:stretch>
+              </a:blipFill>
+            </p:spPr>
+            <p:txBody>
+              <a:bodyPr/>
+              <a:lstStyle/>
+              <a:p>
+                <a:r>
+                  <a:rPr lang="ko-KR" altLang="en-US">
+                    <a:noFill/>
+                  </a:rPr>
+                  <a:t> </a:t>
+                </a:r>
+              </a:p>
+            </p:txBody>
+          </p:sp>
+        </mc:Fallback>
+      </mc:AlternateContent>
+      <p:cxnSp>
+        <p:nvCxnSpPr>
+          <p:cNvPr id="16" name="직선 화살표 연결선 15">
+            <a:extLst>
+              <a:ext uri="{FF2B5EF4-FFF2-40B4-BE49-F238E27FC236}">
+                <a16:creationId xmlns:a16="http://schemas.microsoft.com/office/drawing/2014/main" id="{49725252-87C5-48BC-B551-9DEAC7306D17}"/>
+              </a:ext>
+            </a:extLst>
+          </p:cNvPr>
+          <p:cNvCxnSpPr/>
+          <p:nvPr/>
+        </p:nvCxnSpPr>
+        <p:spPr>
+          <a:xfrm>
+            <a:off x="3696754" y="2506980"/>
+            <a:ext cx="0" cy="1767840"/>
+          </a:xfrm>
+          <a:prstGeom prst="straightConnector1">
+            <a:avLst/>
+          </a:prstGeom>
+          <a:ln w="38100">
+            <a:solidFill>
+              <a:srgbClr val="FF0000"/>
+            </a:solidFill>
+            <a:headEnd type="triangle"/>
+            <a:tailEnd type="triangle"/>
+          </a:ln>
+        </p:spPr>
+        <p:style>
+          <a:lnRef idx="1">
+            <a:schemeClr val="accent1"/>
+          </a:lnRef>
+          <a:fillRef idx="0">
+            <a:schemeClr val="accent1"/>
+          </a:fillRef>
+          <a:effectRef idx="0">
+            <a:schemeClr val="accent1"/>
+          </a:effectRef>
+          <a:fontRef idx="minor">
+            <a:schemeClr val="tx1"/>
+          </a:fontRef>
+        </p:style>
+      </p:cxnSp>
+      <p:cxnSp>
+        <p:nvCxnSpPr>
+          <p:cNvPr id="17" name="직선 화살표 연결선 16">
+            <a:extLst>
+              <a:ext uri="{FF2B5EF4-FFF2-40B4-BE49-F238E27FC236}">
+                <a16:creationId xmlns:a16="http://schemas.microsoft.com/office/drawing/2014/main" id="{65D82F4D-5C3D-4B9D-9A9F-CFA9C27D58DE}"/>
+              </a:ext>
+            </a:extLst>
+          </p:cNvPr>
+          <p:cNvCxnSpPr>
+            <a:cxnSpLocks/>
+          </p:cNvCxnSpPr>
+          <p:nvPr/>
+        </p:nvCxnSpPr>
+        <p:spPr>
+          <a:xfrm>
+            <a:off x="2841826" y="1710690"/>
+            <a:ext cx="1672590" cy="0"/>
+          </a:xfrm>
+          <a:prstGeom prst="straightConnector1">
+            <a:avLst/>
+          </a:prstGeom>
+          <a:ln w="38100">
+            <a:solidFill>
+              <a:srgbClr val="00B0F0"/>
+            </a:solidFill>
+            <a:headEnd type="triangle"/>
+            <a:tailEnd type="triangle"/>
+          </a:ln>
+        </p:spPr>
+        <p:style>
+          <a:lnRef idx="1">
+            <a:schemeClr val="accent1"/>
+          </a:lnRef>
+          <a:fillRef idx="0">
+            <a:schemeClr val="accent1"/>
+          </a:fillRef>
+          <a:effectRef idx="0">
+            <a:schemeClr val="accent1"/>
+          </a:effectRef>
+          <a:fontRef idx="minor">
+            <a:schemeClr val="tx1"/>
+          </a:fontRef>
+        </p:style>
+      </p:cxnSp>
+      <p:pic>
+        <p:nvPicPr>
+          <p:cNvPr id="19" name="그림 18">
+            <a:extLst>
+              <a:ext uri="{FF2B5EF4-FFF2-40B4-BE49-F238E27FC236}">
+                <a16:creationId xmlns:a16="http://schemas.microsoft.com/office/drawing/2014/main" id="{1AC446C3-FA5A-4DE7-B0CE-2BBC5CE7F1B8}"/>
+              </a:ext>
+            </a:extLst>
+          </p:cNvPr>
+          <p:cNvPicPr>
+            <a:picLocks noChangeAspect="1"/>
+          </p:cNvPicPr>
+          <p:nvPr/>
+        </p:nvPicPr>
+        <p:blipFill>
+          <a:blip r:embed="rId11"/>
+          <a:stretch>
+            <a:fillRect/>
+          </a:stretch>
+        </p:blipFill>
+        <p:spPr>
+          <a:xfrm>
+            <a:off x="5790135" y="1143000"/>
+            <a:ext cx="4016375" cy="4572000"/>
+          </a:xfrm>
+          <a:prstGeom prst="rect">
+            <a:avLst/>
+          </a:prstGeom>
+        </p:spPr>
+      </p:pic>
+      <mc:AlternateContent xmlns:mc="http://schemas.openxmlformats.org/markup-compatibility/2006">
+        <mc:Choice xmlns:a14="http://schemas.microsoft.com/office/drawing/2010/main" Requires="a14">
+          <p:sp>
+            <p:nvSpPr>
+              <p:cNvPr id="21" name="TextBox 20">
+                <a:extLst>
+                  <a:ext uri="{FF2B5EF4-FFF2-40B4-BE49-F238E27FC236}">
+                    <a16:creationId xmlns:a16="http://schemas.microsoft.com/office/drawing/2014/main" id="{643E7686-5302-42B0-B2F3-3B177EA128FB}"/>
+                  </a:ext>
+                </a:extLst>
+              </p:cNvPr>
+              <p:cNvSpPr txBox="1"/>
+              <p:nvPr/>
+            </p:nvSpPr>
+            <p:spPr>
+              <a:xfrm>
+                <a:off x="8259336" y="1803831"/>
+                <a:ext cx="1617128" cy="646331"/>
+              </a:xfrm>
+              <a:prstGeom prst="rect">
+                <a:avLst/>
+              </a:prstGeom>
+              <a:noFill/>
+            </p:spPr>
+            <p:txBody>
+              <a:bodyPr wrap="square" rtlCol="0">
+                <a:spAutoFit/>
+              </a:bodyPr>
+              <a:lstStyle/>
+              <a:p>
+                <a:pPr/>
+                <a14:m>
+                  <m:oMathPara xmlns:m="http://schemas.openxmlformats.org/officeDocument/2006/math">
+                    <m:oMathParaPr>
+                      <m:jc m:val="centerGroup"/>
+                    </m:oMathParaPr>
+                    <m:oMath xmlns:m="http://schemas.openxmlformats.org/officeDocument/2006/math">
+                      <m:r>
+                        <a:rPr lang="en-US" altLang="ko-KR" b="0" i="1" smtClean="0">
+                          <a:latin typeface="Cambria Math" panose="02040503050406030204" pitchFamily="18" charset="0"/>
+                        </a:rPr>
+                        <m:t>𝑦</m:t>
+                      </m:r>
+                      <m:r>
+                        <a:rPr lang="en-US" altLang="ko-KR" b="0" i="1" smtClean="0">
+                          <a:latin typeface="Cambria Math" panose="02040503050406030204" pitchFamily="18" charset="0"/>
+                        </a:rPr>
+                        <m:t>=</m:t>
+                      </m:r>
+                      <m:sSup>
+                        <m:sSupPr>
+                          <m:ctrlPr>
+                            <a:rPr lang="en-US" altLang="ko-KR" b="0" i="1" smtClean="0">
+                              <a:latin typeface="Cambria Math" panose="02040503050406030204" pitchFamily="18" charset="0"/>
+                            </a:rPr>
+                          </m:ctrlPr>
+                        </m:sSupPr>
+                        <m:e>
+                          <m:r>
+                            <a:rPr lang="en-US" altLang="ko-KR" b="0" i="1" smtClean="0">
+                              <a:latin typeface="Cambria Math" panose="02040503050406030204" pitchFamily="18" charset="0"/>
+                            </a:rPr>
+                            <m:t>𝑎𝑥</m:t>
+                          </m:r>
+                        </m:e>
+                        <m:sup>
+                          <m:r>
+                            <a:rPr lang="en-US" altLang="ko-KR" b="0" i="1" smtClean="0">
+                              <a:latin typeface="Cambria Math" panose="02040503050406030204" pitchFamily="18" charset="0"/>
+                            </a:rPr>
+                            <m:t>2</m:t>
+                          </m:r>
+                        </m:sup>
+                      </m:sSup>
+                      <m:r>
+                        <a:rPr lang="en-US" altLang="ko-KR" b="0" i="1" smtClean="0">
+                          <a:latin typeface="Cambria Math" panose="02040503050406030204" pitchFamily="18" charset="0"/>
+                        </a:rPr>
+                        <m:t>+</m:t>
+                      </m:r>
+                      <m:r>
+                        <a:rPr lang="en-US" altLang="ko-KR" b="0" i="1" smtClean="0">
+                          <a:latin typeface="Cambria Math" panose="02040503050406030204" pitchFamily="18" charset="0"/>
+                        </a:rPr>
+                        <m:t>𝑐</m:t>
+                      </m:r>
+                    </m:oMath>
+                  </m:oMathPara>
+                </a14:m>
+                <a:endParaRPr lang="en-US" altLang="ko-KR" dirty="0"/>
+              </a:p>
+              <a:p>
+                <a:pPr/>
+                <a14:m>
+                  <m:oMathPara xmlns:m="http://schemas.openxmlformats.org/officeDocument/2006/math">
+                    <m:oMathParaPr>
+                      <m:jc m:val="centerGroup"/>
+                    </m:oMathParaPr>
+                    <m:oMath xmlns:m="http://schemas.openxmlformats.org/officeDocument/2006/math">
+                      <m:r>
+                        <a:rPr lang="en-US" altLang="ko-KR" b="0" i="1" smtClean="0">
+                          <a:latin typeface="Cambria Math" panose="02040503050406030204" pitchFamily="18" charset="0"/>
+                        </a:rPr>
+                        <m:t>𝑎</m:t>
+                      </m:r>
+                      <m:r>
+                        <a:rPr lang="en-US" altLang="ko-KR" b="0" i="1" smtClean="0">
+                          <a:latin typeface="Cambria Math" panose="02040503050406030204" pitchFamily="18" charset="0"/>
+                        </a:rPr>
+                        <m:t>=0</m:t>
+                      </m:r>
+                    </m:oMath>
+                  </m:oMathPara>
+                </a14:m>
+                <a:endParaRPr lang="ko-KR" altLang="en-US" dirty="0"/>
+              </a:p>
+            </p:txBody>
+          </p:sp>
+        </mc:Choice>
+        <mc:Fallback>
+          <p:sp>
+            <p:nvSpPr>
+              <p:cNvPr id="21" name="TextBox 20">
+                <a:extLst>
+                  <a:ext uri="{FF2B5EF4-FFF2-40B4-BE49-F238E27FC236}">
+                    <a16:creationId xmlns:a16="http://schemas.microsoft.com/office/drawing/2014/main" id="{643E7686-5302-42B0-B2F3-3B177EA128FB}"/>
+                  </a:ext>
+                </a:extLst>
+              </p:cNvPr>
+              <p:cNvSpPr txBox="1">
+                <a:spLocks noRot="1" noChangeAspect="1" noMove="1" noResize="1" noEditPoints="1" noAdjustHandles="1" noChangeArrowheads="1" noChangeShapeType="1" noTextEdit="1"/>
+              </p:cNvSpPr>
+              <p:nvPr/>
+            </p:nvSpPr>
+            <p:spPr>
+              <a:xfrm>
+                <a:off x="8259336" y="1803831"/>
+                <a:ext cx="1617128" cy="646331"/>
+              </a:xfrm>
+              <a:prstGeom prst="rect">
+                <a:avLst/>
+              </a:prstGeom>
+              <a:blipFill>
+                <a:blip r:embed="rId12"/>
+                <a:stretch>
+                  <a:fillRect/>
+                </a:stretch>
+              </a:blipFill>
+            </p:spPr>
+            <p:txBody>
+              <a:bodyPr/>
+              <a:lstStyle/>
+              <a:p>
+                <a:r>
+                  <a:rPr lang="ko-KR" altLang="en-US">
+                    <a:noFill/>
+                  </a:rPr>
+                  <a:t> </a:t>
+                </a:r>
+              </a:p>
+            </p:txBody>
+          </p:sp>
+        </mc:Fallback>
+      </mc:AlternateContent>
+      <p:cxnSp>
+        <p:nvCxnSpPr>
+          <p:cNvPr id="22" name="직선 화살표 연결선 21">
+            <a:extLst>
+              <a:ext uri="{FF2B5EF4-FFF2-40B4-BE49-F238E27FC236}">
+                <a16:creationId xmlns:a16="http://schemas.microsoft.com/office/drawing/2014/main" id="{8950E8CA-51BF-41B9-B3C2-799A4C994762}"/>
+              </a:ext>
+            </a:extLst>
+          </p:cNvPr>
+          <p:cNvCxnSpPr/>
+          <p:nvPr/>
+        </p:nvCxnSpPr>
+        <p:spPr>
+          <a:xfrm>
+            <a:off x="7778792" y="1710690"/>
+            <a:ext cx="0" cy="1767840"/>
+          </a:xfrm>
+          <a:prstGeom prst="straightConnector1">
+            <a:avLst/>
+          </a:prstGeom>
+          <a:ln w="38100">
+            <a:solidFill>
+              <a:srgbClr val="FF0000"/>
+            </a:solidFill>
+            <a:headEnd type="triangle"/>
+            <a:tailEnd type="triangle"/>
+          </a:ln>
+        </p:spPr>
+        <p:style>
+          <a:lnRef idx="1">
+            <a:schemeClr val="accent1"/>
+          </a:lnRef>
+          <a:fillRef idx="0">
+            <a:schemeClr val="accent1"/>
+          </a:fillRef>
+          <a:effectRef idx="0">
+            <a:schemeClr val="accent1"/>
+          </a:effectRef>
+          <a:fontRef idx="minor">
+            <a:schemeClr val="tx1"/>
+          </a:fontRef>
+        </p:style>
+      </p:cxnSp>
+      <mc:AlternateContent xmlns:mc="http://schemas.openxmlformats.org/markup-compatibility/2006">
+        <mc:Choice xmlns:a14="http://schemas.microsoft.com/office/drawing/2010/main" Requires="a14">
+          <p:sp>
+            <p:nvSpPr>
+              <p:cNvPr id="23" name="TextBox 22">
+                <a:extLst>
+                  <a:ext uri="{FF2B5EF4-FFF2-40B4-BE49-F238E27FC236}">
+                    <a16:creationId xmlns:a16="http://schemas.microsoft.com/office/drawing/2014/main" id="{A71431F8-F7BE-4B55-9204-FDBA00EE7039}"/>
+                  </a:ext>
+                </a:extLst>
+              </p:cNvPr>
+              <p:cNvSpPr txBox="1"/>
+              <p:nvPr/>
+            </p:nvSpPr>
+            <p:spPr>
+              <a:xfrm>
+                <a:off x="7321750" y="3439027"/>
+                <a:ext cx="622738" cy="369332"/>
+              </a:xfrm>
+              <a:prstGeom prst="rect">
+                <a:avLst/>
+              </a:prstGeom>
+              <a:noFill/>
+            </p:spPr>
+            <p:txBody>
+              <a:bodyPr wrap="square" rtlCol="0">
+                <a:spAutoFit/>
+              </a:bodyPr>
+              <a:lstStyle/>
+              <a:p>
+                <a:pPr/>
+                <a14:m>
+                  <m:oMathPara xmlns:m="http://schemas.openxmlformats.org/officeDocument/2006/math">
+                    <m:oMathParaPr>
+                      <m:jc m:val="centerGroup"/>
+                    </m:oMathParaPr>
+                    <m:oMath xmlns:m="http://schemas.openxmlformats.org/officeDocument/2006/math">
+                      <m:r>
+                        <a:rPr lang="en-US" altLang="ko-KR" b="0" i="1" smtClean="0">
+                          <a:latin typeface="Cambria Math" panose="02040503050406030204" pitchFamily="18" charset="0"/>
+                        </a:rPr>
+                        <m:t>𝑂</m:t>
+                      </m:r>
+                    </m:oMath>
+                  </m:oMathPara>
+                </a14:m>
+                <a:endParaRPr lang="ko-KR" altLang="en-US" dirty="0"/>
+              </a:p>
+            </p:txBody>
+          </p:sp>
+        </mc:Choice>
+        <mc:Fallback>
+          <p:sp>
+            <p:nvSpPr>
+              <p:cNvPr id="23" name="TextBox 22">
+                <a:extLst>
+                  <a:ext uri="{FF2B5EF4-FFF2-40B4-BE49-F238E27FC236}">
+                    <a16:creationId xmlns:a16="http://schemas.microsoft.com/office/drawing/2014/main" id="{A71431F8-F7BE-4B55-9204-FDBA00EE7039}"/>
+                  </a:ext>
+                </a:extLst>
+              </p:cNvPr>
+              <p:cNvSpPr txBox="1">
+                <a:spLocks noRot="1" noChangeAspect="1" noMove="1" noResize="1" noEditPoints="1" noAdjustHandles="1" noChangeArrowheads="1" noChangeShapeType="1" noTextEdit="1"/>
+              </p:cNvSpPr>
+              <p:nvPr/>
+            </p:nvSpPr>
+            <p:spPr>
+              <a:xfrm>
+                <a:off x="7321750" y="3439027"/>
+                <a:ext cx="622738" cy="369332"/>
+              </a:xfrm>
+              <a:prstGeom prst="rect">
+                <a:avLst/>
+              </a:prstGeom>
+              <a:blipFill>
+                <a:blip r:embed="rId13"/>
+                <a:stretch>
+                  <a:fillRect/>
+                </a:stretch>
+              </a:blipFill>
+            </p:spPr>
+            <p:txBody>
+              <a:bodyPr/>
+              <a:lstStyle/>
+              <a:p>
+                <a:r>
+                  <a:rPr lang="ko-KR" altLang="en-US">
+                    <a:noFill/>
+                  </a:rPr>
+                  <a:t> </a:t>
+                </a:r>
+              </a:p>
+            </p:txBody>
+          </p:sp>
+        </mc:Fallback>
+      </mc:AlternateContent>
+      <mc:AlternateContent xmlns:mc="http://schemas.openxmlformats.org/markup-compatibility/2006">
+        <mc:Choice xmlns:a14="http://schemas.microsoft.com/office/drawing/2010/main" Requires="a14">
+          <p:sp>
+            <p:nvSpPr>
+              <p:cNvPr id="24" name="TextBox 23">
+                <a:extLst>
+                  <a:ext uri="{FF2B5EF4-FFF2-40B4-BE49-F238E27FC236}">
+                    <a16:creationId xmlns:a16="http://schemas.microsoft.com/office/drawing/2014/main" id="{23570580-4006-4F93-86A4-43BC36CC0584}"/>
+                  </a:ext>
+                </a:extLst>
+              </p:cNvPr>
+              <p:cNvSpPr txBox="1"/>
+              <p:nvPr/>
+            </p:nvSpPr>
+            <p:spPr>
+              <a:xfrm>
+                <a:off x="9404651" y="3429000"/>
+                <a:ext cx="622738" cy="369332"/>
+              </a:xfrm>
+              <a:prstGeom prst="rect">
+                <a:avLst/>
+              </a:prstGeom>
+              <a:noFill/>
+            </p:spPr>
+            <p:txBody>
+              <a:bodyPr wrap="square" rtlCol="0">
+                <a:spAutoFit/>
+              </a:bodyPr>
+              <a:lstStyle/>
+              <a:p>
+                <a:pPr/>
+                <a14:m>
+                  <m:oMathPara xmlns:m="http://schemas.openxmlformats.org/officeDocument/2006/math">
+                    <m:oMathParaPr>
+                      <m:jc m:val="centerGroup"/>
+                    </m:oMathParaPr>
+                    <m:oMath xmlns:m="http://schemas.openxmlformats.org/officeDocument/2006/math">
+                      <m:r>
+                        <a:rPr lang="en-US" altLang="ko-KR" b="0" i="1" smtClean="0">
+                          <a:latin typeface="Cambria Math" panose="02040503050406030204" pitchFamily="18" charset="0"/>
+                        </a:rPr>
+                        <m:t>𝑥</m:t>
+                      </m:r>
+                    </m:oMath>
+                  </m:oMathPara>
+                </a14:m>
+                <a:endParaRPr lang="ko-KR" altLang="en-US" dirty="0"/>
+              </a:p>
+            </p:txBody>
+          </p:sp>
+        </mc:Choice>
+        <mc:Fallback>
+          <p:sp>
+            <p:nvSpPr>
+              <p:cNvPr id="24" name="TextBox 23">
+                <a:extLst>
+                  <a:ext uri="{FF2B5EF4-FFF2-40B4-BE49-F238E27FC236}">
+                    <a16:creationId xmlns:a16="http://schemas.microsoft.com/office/drawing/2014/main" id="{23570580-4006-4F93-86A4-43BC36CC0584}"/>
+                  </a:ext>
+                </a:extLst>
+              </p:cNvPr>
+              <p:cNvSpPr txBox="1">
+                <a:spLocks noRot="1" noChangeAspect="1" noMove="1" noResize="1" noEditPoints="1" noAdjustHandles="1" noChangeArrowheads="1" noChangeShapeType="1" noTextEdit="1"/>
+              </p:cNvSpPr>
+              <p:nvPr/>
+            </p:nvSpPr>
+            <p:spPr>
+              <a:xfrm>
+                <a:off x="9404651" y="3429000"/>
+                <a:ext cx="622738" cy="369332"/>
+              </a:xfrm>
+              <a:prstGeom prst="rect">
+                <a:avLst/>
+              </a:prstGeom>
+              <a:blipFill>
+                <a:blip r:embed="rId14"/>
+                <a:stretch>
+                  <a:fillRect/>
+                </a:stretch>
+              </a:blipFill>
+            </p:spPr>
+            <p:txBody>
+              <a:bodyPr/>
+              <a:lstStyle/>
+              <a:p>
+                <a:r>
+                  <a:rPr lang="ko-KR" altLang="en-US">
+                    <a:noFill/>
+                  </a:rPr>
+                  <a:t> </a:t>
+                </a:r>
+              </a:p>
+            </p:txBody>
+          </p:sp>
+        </mc:Fallback>
+      </mc:AlternateContent>
+      <mc:AlternateContent xmlns:mc="http://schemas.openxmlformats.org/markup-compatibility/2006">
+        <mc:Choice xmlns:a14="http://schemas.microsoft.com/office/drawing/2010/main" Requires="a14">
+          <p:sp>
+            <p:nvSpPr>
+              <p:cNvPr id="25" name="TextBox 24">
+                <a:extLst>
+                  <a:ext uri="{FF2B5EF4-FFF2-40B4-BE49-F238E27FC236}">
+                    <a16:creationId xmlns:a16="http://schemas.microsoft.com/office/drawing/2014/main" id="{5BA8703C-2940-47DB-82D3-08810ADA2209}"/>
+                  </a:ext>
+                </a:extLst>
+              </p:cNvPr>
+              <p:cNvSpPr txBox="1"/>
+              <p:nvPr/>
+            </p:nvSpPr>
+            <p:spPr>
+              <a:xfrm>
+                <a:off x="7321750" y="998929"/>
+                <a:ext cx="622738" cy="369332"/>
+              </a:xfrm>
+              <a:prstGeom prst="rect">
+                <a:avLst/>
+              </a:prstGeom>
+              <a:noFill/>
+            </p:spPr>
+            <p:txBody>
+              <a:bodyPr wrap="square" rtlCol="0">
+                <a:spAutoFit/>
+              </a:bodyPr>
+              <a:lstStyle/>
+              <a:p>
+                <a:pPr/>
+                <a14:m>
+                  <m:oMathPara xmlns:m="http://schemas.openxmlformats.org/officeDocument/2006/math">
+                    <m:oMathParaPr>
+                      <m:jc m:val="centerGroup"/>
+                    </m:oMathParaPr>
+                    <m:oMath xmlns:m="http://schemas.openxmlformats.org/officeDocument/2006/math">
+                      <m:r>
+                        <a:rPr lang="en-US" altLang="ko-KR" b="0" i="1" smtClean="0">
+                          <a:latin typeface="Cambria Math" panose="02040503050406030204" pitchFamily="18" charset="0"/>
+                        </a:rPr>
+                        <m:t>𝑦</m:t>
+                      </m:r>
+                    </m:oMath>
+                  </m:oMathPara>
+                </a14:m>
+                <a:endParaRPr lang="ko-KR" altLang="en-US" dirty="0"/>
+              </a:p>
+            </p:txBody>
+          </p:sp>
+        </mc:Choice>
+        <mc:Fallback>
+          <p:sp>
+            <p:nvSpPr>
+              <p:cNvPr id="25" name="TextBox 24">
+                <a:extLst>
+                  <a:ext uri="{FF2B5EF4-FFF2-40B4-BE49-F238E27FC236}">
+                    <a16:creationId xmlns:a16="http://schemas.microsoft.com/office/drawing/2014/main" id="{5BA8703C-2940-47DB-82D3-08810ADA2209}"/>
+                  </a:ext>
+                </a:extLst>
+              </p:cNvPr>
+              <p:cNvSpPr txBox="1">
+                <a:spLocks noRot="1" noChangeAspect="1" noMove="1" noResize="1" noEditPoints="1" noAdjustHandles="1" noChangeArrowheads="1" noChangeShapeType="1" noTextEdit="1"/>
+              </p:cNvSpPr>
+              <p:nvPr/>
+            </p:nvSpPr>
+            <p:spPr>
+              <a:xfrm>
+                <a:off x="7321750" y="998929"/>
+                <a:ext cx="622738" cy="369332"/>
+              </a:xfrm>
+              <a:prstGeom prst="rect">
+                <a:avLst/>
+              </a:prstGeom>
+              <a:blipFill>
+                <a:blip r:embed="rId15"/>
+                <a:stretch>
+                  <a:fillRect b="-10000"/>
+                </a:stretch>
+              </a:blipFill>
+            </p:spPr>
+            <p:txBody>
+              <a:bodyPr/>
+              <a:lstStyle/>
+              <a:p>
+                <a:r>
+                  <a:rPr lang="ko-KR" altLang="en-US">
+                    <a:noFill/>
+                  </a:rPr>
+                  <a:t> </a:t>
+                </a:r>
+              </a:p>
+            </p:txBody>
+          </p:sp>
+        </mc:Fallback>
+      </mc:AlternateContent>
+      <p:pic>
+        <p:nvPicPr>
+          <p:cNvPr id="20" name="그림 19">
+            <a:extLst>
+              <a:ext uri="{FF2B5EF4-FFF2-40B4-BE49-F238E27FC236}">
+                <a16:creationId xmlns:a16="http://schemas.microsoft.com/office/drawing/2014/main" id="{DE34439E-320C-4781-9580-66E48A2B1484}"/>
+              </a:ext>
+            </a:extLst>
+          </p:cNvPr>
+          <p:cNvPicPr>
+            <a:picLocks noChangeAspect="1"/>
+          </p:cNvPicPr>
+          <p:nvPr/>
+        </p:nvPicPr>
+        <p:blipFill>
+          <a:blip r:embed="rId16"/>
+          <a:stretch>
+            <a:fillRect/>
+          </a:stretch>
+        </p:blipFill>
+        <p:spPr>
+          <a:xfrm>
+            <a:off x="9933145" y="1143000"/>
+            <a:ext cx="4016375" cy="4572000"/>
+          </a:xfrm>
+          <a:prstGeom prst="rect">
+            <a:avLst/>
+          </a:prstGeom>
+        </p:spPr>
+      </p:pic>
+      <mc:AlternateContent xmlns:mc="http://schemas.openxmlformats.org/markup-compatibility/2006">
+        <mc:Choice xmlns:a14="http://schemas.microsoft.com/office/drawing/2010/main" Requires="a14">
+          <p:sp>
+            <p:nvSpPr>
+              <p:cNvPr id="27" name="TextBox 26">
+                <a:extLst>
+                  <a:ext uri="{FF2B5EF4-FFF2-40B4-BE49-F238E27FC236}">
+                    <a16:creationId xmlns:a16="http://schemas.microsoft.com/office/drawing/2014/main" id="{0EEE3E2E-052F-4D11-B06D-B1FA3A88BE9A}"/>
+                  </a:ext>
+                </a:extLst>
+              </p:cNvPr>
+              <p:cNvSpPr txBox="1"/>
+              <p:nvPr/>
+            </p:nvSpPr>
+            <p:spPr>
+              <a:xfrm>
+                <a:off x="11448920" y="3439027"/>
+                <a:ext cx="622738" cy="369332"/>
+              </a:xfrm>
+              <a:prstGeom prst="rect">
+                <a:avLst/>
+              </a:prstGeom>
+              <a:noFill/>
+            </p:spPr>
+            <p:txBody>
+              <a:bodyPr wrap="square" rtlCol="0">
+                <a:spAutoFit/>
+              </a:bodyPr>
+              <a:lstStyle/>
+              <a:p>
+                <a:pPr/>
+                <a14:m>
+                  <m:oMathPara xmlns:m="http://schemas.openxmlformats.org/officeDocument/2006/math">
+                    <m:oMathParaPr>
+                      <m:jc m:val="centerGroup"/>
+                    </m:oMathParaPr>
+                    <m:oMath xmlns:m="http://schemas.openxmlformats.org/officeDocument/2006/math">
+                      <m:r>
+                        <a:rPr lang="en-US" altLang="ko-KR" b="0" i="1" smtClean="0">
+                          <a:latin typeface="Cambria Math" panose="02040503050406030204" pitchFamily="18" charset="0"/>
+                        </a:rPr>
+                        <m:t>𝑂</m:t>
+                      </m:r>
+                    </m:oMath>
+                  </m:oMathPara>
+                </a14:m>
+                <a:endParaRPr lang="ko-KR" altLang="en-US" dirty="0"/>
+              </a:p>
+            </p:txBody>
+          </p:sp>
+        </mc:Choice>
+        <mc:Fallback>
+          <p:sp>
+            <p:nvSpPr>
+              <p:cNvPr id="27" name="TextBox 26">
+                <a:extLst>
+                  <a:ext uri="{FF2B5EF4-FFF2-40B4-BE49-F238E27FC236}">
+                    <a16:creationId xmlns:a16="http://schemas.microsoft.com/office/drawing/2014/main" id="{0EEE3E2E-052F-4D11-B06D-B1FA3A88BE9A}"/>
+                  </a:ext>
+                </a:extLst>
+              </p:cNvPr>
+              <p:cNvSpPr txBox="1">
+                <a:spLocks noRot="1" noChangeAspect="1" noMove="1" noResize="1" noEditPoints="1" noAdjustHandles="1" noChangeArrowheads="1" noChangeShapeType="1" noTextEdit="1"/>
+              </p:cNvSpPr>
+              <p:nvPr/>
+            </p:nvSpPr>
+            <p:spPr>
+              <a:xfrm>
+                <a:off x="11448920" y="3439027"/>
+                <a:ext cx="622738" cy="369332"/>
+              </a:xfrm>
+              <a:prstGeom prst="rect">
+                <a:avLst/>
+              </a:prstGeom>
+              <a:blipFill>
+                <a:blip r:embed="rId17"/>
+                <a:stretch>
+                  <a:fillRect/>
+                </a:stretch>
+              </a:blipFill>
+            </p:spPr>
+            <p:txBody>
+              <a:bodyPr/>
+              <a:lstStyle/>
+              <a:p>
+                <a:r>
+                  <a:rPr lang="ko-KR" altLang="en-US">
+                    <a:noFill/>
+                  </a:rPr>
+                  <a:t> </a:t>
+                </a:r>
+              </a:p>
+            </p:txBody>
+          </p:sp>
+        </mc:Fallback>
+      </mc:AlternateContent>
+      <mc:AlternateContent xmlns:mc="http://schemas.openxmlformats.org/markup-compatibility/2006">
+        <mc:Choice xmlns:a14="http://schemas.microsoft.com/office/drawing/2010/main" Requires="a14">
+          <p:sp>
+            <p:nvSpPr>
+              <p:cNvPr id="28" name="TextBox 27">
+                <a:extLst>
+                  <a:ext uri="{FF2B5EF4-FFF2-40B4-BE49-F238E27FC236}">
+                    <a16:creationId xmlns:a16="http://schemas.microsoft.com/office/drawing/2014/main" id="{8E57C379-036E-47A2-97C1-17DED1AA91D0}"/>
+                  </a:ext>
+                </a:extLst>
+              </p:cNvPr>
+              <p:cNvSpPr txBox="1"/>
+              <p:nvPr/>
+            </p:nvSpPr>
+            <p:spPr>
+              <a:xfrm>
+                <a:off x="13531821" y="3429000"/>
+                <a:ext cx="622738" cy="369332"/>
+              </a:xfrm>
+              <a:prstGeom prst="rect">
+                <a:avLst/>
+              </a:prstGeom>
+              <a:noFill/>
+            </p:spPr>
+            <p:txBody>
+              <a:bodyPr wrap="square" rtlCol="0">
+                <a:spAutoFit/>
+              </a:bodyPr>
+              <a:lstStyle/>
+              <a:p>
+                <a:pPr/>
+                <a14:m>
+                  <m:oMathPara xmlns:m="http://schemas.openxmlformats.org/officeDocument/2006/math">
+                    <m:oMathParaPr>
+                      <m:jc m:val="centerGroup"/>
+                    </m:oMathParaPr>
+                    <m:oMath xmlns:m="http://schemas.openxmlformats.org/officeDocument/2006/math">
+                      <m:r>
+                        <a:rPr lang="en-US" altLang="ko-KR" b="0" i="1" smtClean="0">
+                          <a:latin typeface="Cambria Math" panose="02040503050406030204" pitchFamily="18" charset="0"/>
+                        </a:rPr>
+                        <m:t>𝑥</m:t>
+                      </m:r>
+                    </m:oMath>
+                  </m:oMathPara>
+                </a14:m>
+                <a:endParaRPr lang="ko-KR" altLang="en-US" dirty="0"/>
+              </a:p>
+            </p:txBody>
+          </p:sp>
+        </mc:Choice>
+        <mc:Fallback>
+          <p:sp>
+            <p:nvSpPr>
+              <p:cNvPr id="28" name="TextBox 27">
+                <a:extLst>
+                  <a:ext uri="{FF2B5EF4-FFF2-40B4-BE49-F238E27FC236}">
+                    <a16:creationId xmlns:a16="http://schemas.microsoft.com/office/drawing/2014/main" id="{8E57C379-036E-47A2-97C1-17DED1AA91D0}"/>
+                  </a:ext>
+                </a:extLst>
+              </p:cNvPr>
+              <p:cNvSpPr txBox="1">
+                <a:spLocks noRot="1" noChangeAspect="1" noMove="1" noResize="1" noEditPoints="1" noAdjustHandles="1" noChangeArrowheads="1" noChangeShapeType="1" noTextEdit="1"/>
+              </p:cNvSpPr>
+              <p:nvPr/>
+            </p:nvSpPr>
+            <p:spPr>
+              <a:xfrm>
+                <a:off x="13531821" y="3429000"/>
+                <a:ext cx="622738" cy="369332"/>
+              </a:xfrm>
+              <a:prstGeom prst="rect">
+                <a:avLst/>
+              </a:prstGeom>
+              <a:blipFill>
+                <a:blip r:embed="rId18"/>
+                <a:stretch>
+                  <a:fillRect/>
+                </a:stretch>
+              </a:blipFill>
+            </p:spPr>
+            <p:txBody>
+              <a:bodyPr/>
+              <a:lstStyle/>
+              <a:p>
+                <a:r>
+                  <a:rPr lang="ko-KR" altLang="en-US">
+                    <a:noFill/>
+                  </a:rPr>
+                  <a:t> </a:t>
+                </a:r>
+              </a:p>
+            </p:txBody>
+          </p:sp>
+        </mc:Fallback>
+      </mc:AlternateContent>
+      <mc:AlternateContent xmlns:mc="http://schemas.openxmlformats.org/markup-compatibility/2006">
+        <mc:Choice xmlns:a14="http://schemas.microsoft.com/office/drawing/2010/main" Requires="a14">
+          <p:sp>
+            <p:nvSpPr>
+              <p:cNvPr id="29" name="TextBox 28">
+                <a:extLst>
+                  <a:ext uri="{FF2B5EF4-FFF2-40B4-BE49-F238E27FC236}">
+                    <a16:creationId xmlns:a16="http://schemas.microsoft.com/office/drawing/2014/main" id="{13CF3D3B-71A4-40B3-8003-DFEDFAA1430C}"/>
+                  </a:ext>
+                </a:extLst>
+              </p:cNvPr>
+              <p:cNvSpPr txBox="1"/>
+              <p:nvPr/>
+            </p:nvSpPr>
+            <p:spPr>
+              <a:xfrm>
+                <a:off x="11448920" y="998929"/>
+                <a:ext cx="622738" cy="369332"/>
+              </a:xfrm>
+              <a:prstGeom prst="rect">
+                <a:avLst/>
+              </a:prstGeom>
+              <a:noFill/>
+            </p:spPr>
+            <p:txBody>
+              <a:bodyPr wrap="square" rtlCol="0">
+                <a:spAutoFit/>
+              </a:bodyPr>
+              <a:lstStyle/>
+              <a:p>
+                <a:pPr/>
+                <a14:m>
+                  <m:oMathPara xmlns:m="http://schemas.openxmlformats.org/officeDocument/2006/math">
+                    <m:oMathParaPr>
+                      <m:jc m:val="centerGroup"/>
+                    </m:oMathParaPr>
+                    <m:oMath xmlns:m="http://schemas.openxmlformats.org/officeDocument/2006/math">
+                      <m:r>
+                        <a:rPr lang="en-US" altLang="ko-KR" b="0" i="1" smtClean="0">
+                          <a:latin typeface="Cambria Math" panose="02040503050406030204" pitchFamily="18" charset="0"/>
+                        </a:rPr>
+                        <m:t>𝑦</m:t>
+                      </m:r>
+                    </m:oMath>
+                  </m:oMathPara>
+                </a14:m>
+                <a:endParaRPr lang="ko-KR" altLang="en-US" dirty="0"/>
+              </a:p>
+            </p:txBody>
+          </p:sp>
+        </mc:Choice>
+        <mc:Fallback>
+          <p:sp>
+            <p:nvSpPr>
+              <p:cNvPr id="29" name="TextBox 28">
+                <a:extLst>
+                  <a:ext uri="{FF2B5EF4-FFF2-40B4-BE49-F238E27FC236}">
+                    <a16:creationId xmlns:a16="http://schemas.microsoft.com/office/drawing/2014/main" id="{13CF3D3B-71A4-40B3-8003-DFEDFAA1430C}"/>
+                  </a:ext>
+                </a:extLst>
+              </p:cNvPr>
+              <p:cNvSpPr txBox="1">
+                <a:spLocks noRot="1" noChangeAspect="1" noMove="1" noResize="1" noEditPoints="1" noAdjustHandles="1" noChangeArrowheads="1" noChangeShapeType="1" noTextEdit="1"/>
+              </p:cNvSpPr>
+              <p:nvPr/>
+            </p:nvSpPr>
+            <p:spPr>
+              <a:xfrm>
+                <a:off x="11448920" y="998929"/>
+                <a:ext cx="622738" cy="369332"/>
+              </a:xfrm>
+              <a:prstGeom prst="rect">
+                <a:avLst/>
+              </a:prstGeom>
+              <a:blipFill>
+                <a:blip r:embed="rId19"/>
+                <a:stretch>
+                  <a:fillRect b="-10000"/>
+                </a:stretch>
+              </a:blipFill>
+            </p:spPr>
+            <p:txBody>
+              <a:bodyPr/>
+              <a:lstStyle/>
+              <a:p>
+                <a:r>
+                  <a:rPr lang="ko-KR" altLang="en-US">
+                    <a:noFill/>
+                  </a:rPr>
+                  <a:t> </a:t>
+                </a:r>
+              </a:p>
+            </p:txBody>
+          </p:sp>
+        </mc:Fallback>
+      </mc:AlternateContent>
+      <p:cxnSp>
+        <p:nvCxnSpPr>
+          <p:cNvPr id="30" name="직선 화살표 연결선 29">
+            <a:extLst>
+              <a:ext uri="{FF2B5EF4-FFF2-40B4-BE49-F238E27FC236}">
+                <a16:creationId xmlns:a16="http://schemas.microsoft.com/office/drawing/2014/main" id="{59259E7E-8CCF-4625-951B-2D16E879915F}"/>
+              </a:ext>
+            </a:extLst>
+          </p:cNvPr>
+          <p:cNvCxnSpPr/>
+          <p:nvPr/>
+        </p:nvCxnSpPr>
+        <p:spPr>
+          <a:xfrm>
+            <a:off x="11917464" y="2506980"/>
+            <a:ext cx="0" cy="1767840"/>
+          </a:xfrm>
+          <a:prstGeom prst="straightConnector1">
+            <a:avLst/>
+          </a:prstGeom>
+          <a:ln w="38100">
+            <a:solidFill>
+              <a:srgbClr val="FF0000"/>
+            </a:solidFill>
+            <a:headEnd type="triangle"/>
+            <a:tailEnd type="triangle"/>
+          </a:ln>
+        </p:spPr>
+        <p:style>
+          <a:lnRef idx="1">
+            <a:schemeClr val="accent1"/>
+          </a:lnRef>
+          <a:fillRef idx="0">
+            <a:schemeClr val="accent1"/>
+          </a:fillRef>
+          <a:effectRef idx="0">
+            <a:schemeClr val="accent1"/>
+          </a:effectRef>
+          <a:fontRef idx="minor">
+            <a:schemeClr val="tx1"/>
+          </a:fontRef>
+        </p:style>
+      </p:cxnSp>
+      <p:cxnSp>
+        <p:nvCxnSpPr>
+          <p:cNvPr id="31" name="직선 화살표 연결선 30">
+            <a:extLst>
+              <a:ext uri="{FF2B5EF4-FFF2-40B4-BE49-F238E27FC236}">
+                <a16:creationId xmlns:a16="http://schemas.microsoft.com/office/drawing/2014/main" id="{50174E1E-91B3-4B64-A618-D7CA878CC249}"/>
+              </a:ext>
+            </a:extLst>
+          </p:cNvPr>
+          <p:cNvCxnSpPr>
+            <a:cxnSpLocks/>
+          </p:cNvCxnSpPr>
+          <p:nvPr/>
+        </p:nvCxnSpPr>
+        <p:spPr>
+          <a:xfrm>
+            <a:off x="11062536" y="5129530"/>
+            <a:ext cx="1672590" cy="0"/>
+          </a:xfrm>
+          <a:prstGeom prst="straightConnector1">
+            <a:avLst/>
+          </a:prstGeom>
+          <a:ln w="38100">
+            <a:solidFill>
+              <a:srgbClr val="00B0F0"/>
+            </a:solidFill>
+            <a:headEnd type="triangle"/>
+            <a:tailEnd type="triangle"/>
+          </a:ln>
+        </p:spPr>
+        <p:style>
+          <a:lnRef idx="1">
+            <a:schemeClr val="accent1"/>
+          </a:lnRef>
+          <a:fillRef idx="0">
+            <a:schemeClr val="accent1"/>
+          </a:fillRef>
+          <a:effectRef idx="0">
+            <a:schemeClr val="accent1"/>
+          </a:effectRef>
+          <a:fontRef idx="minor">
+            <a:schemeClr val="tx1"/>
+          </a:fontRef>
+        </p:style>
+      </p:cxnSp>
+      <mc:AlternateContent xmlns:mc="http://schemas.openxmlformats.org/markup-compatibility/2006">
+        <mc:Choice xmlns:a14="http://schemas.microsoft.com/office/drawing/2010/main" Requires="a14">
+          <p:sp>
+            <p:nvSpPr>
+              <p:cNvPr id="32" name="TextBox 31">
+                <a:extLst>
+                  <a:ext uri="{FF2B5EF4-FFF2-40B4-BE49-F238E27FC236}">
+                    <a16:creationId xmlns:a16="http://schemas.microsoft.com/office/drawing/2014/main" id="{E0DE37FF-96FE-4A02-84BB-76AF4982698A}"/>
+                  </a:ext>
+                </a:extLst>
+              </p:cNvPr>
+              <p:cNvSpPr txBox="1"/>
+              <p:nvPr/>
+            </p:nvSpPr>
+            <p:spPr>
+              <a:xfrm>
+                <a:off x="10013973" y="4099612"/>
+                <a:ext cx="1617128" cy="646331"/>
+              </a:xfrm>
+              <a:prstGeom prst="rect">
+                <a:avLst/>
+              </a:prstGeom>
+              <a:noFill/>
+            </p:spPr>
+            <p:txBody>
+              <a:bodyPr wrap="square" rtlCol="0">
+                <a:spAutoFit/>
+              </a:bodyPr>
+              <a:lstStyle/>
+              <a:p>
+                <a:pPr/>
+                <a14:m>
+                  <m:oMathPara xmlns:m="http://schemas.openxmlformats.org/officeDocument/2006/math">
+                    <m:oMathParaPr>
+                      <m:jc m:val="centerGroup"/>
+                    </m:oMathParaPr>
+                    <m:oMath xmlns:m="http://schemas.openxmlformats.org/officeDocument/2006/math">
+                      <m:r>
+                        <a:rPr lang="en-US" altLang="ko-KR" b="0" i="1" smtClean="0">
+                          <a:latin typeface="Cambria Math" panose="02040503050406030204" pitchFamily="18" charset="0"/>
+                        </a:rPr>
+                        <m:t>𝑦</m:t>
+                      </m:r>
+                      <m:r>
+                        <a:rPr lang="en-US" altLang="ko-KR" b="0" i="1" smtClean="0">
+                          <a:latin typeface="Cambria Math" panose="02040503050406030204" pitchFamily="18" charset="0"/>
+                        </a:rPr>
+                        <m:t>=</m:t>
+                      </m:r>
+                      <m:sSup>
+                        <m:sSupPr>
+                          <m:ctrlPr>
+                            <a:rPr lang="en-US" altLang="ko-KR" b="0" i="1" smtClean="0">
+                              <a:latin typeface="Cambria Math" panose="02040503050406030204" pitchFamily="18" charset="0"/>
+                            </a:rPr>
+                          </m:ctrlPr>
+                        </m:sSupPr>
+                        <m:e>
+                          <m:r>
+                            <a:rPr lang="en-US" altLang="ko-KR" b="0" i="1" smtClean="0">
+                              <a:latin typeface="Cambria Math" panose="02040503050406030204" pitchFamily="18" charset="0"/>
+                            </a:rPr>
+                            <m:t>𝑎𝑥</m:t>
+                          </m:r>
+                        </m:e>
+                        <m:sup>
+                          <m:r>
+                            <a:rPr lang="en-US" altLang="ko-KR" b="0" i="1" smtClean="0">
+                              <a:latin typeface="Cambria Math" panose="02040503050406030204" pitchFamily="18" charset="0"/>
+                            </a:rPr>
+                            <m:t>2</m:t>
+                          </m:r>
+                        </m:sup>
+                      </m:sSup>
+                      <m:r>
+                        <a:rPr lang="en-US" altLang="ko-KR" b="0" i="1" smtClean="0">
+                          <a:latin typeface="Cambria Math" panose="02040503050406030204" pitchFamily="18" charset="0"/>
+                        </a:rPr>
+                        <m:t>+</m:t>
+                      </m:r>
+                      <m:r>
+                        <a:rPr lang="en-US" altLang="ko-KR" b="0" i="1" smtClean="0">
+                          <a:latin typeface="Cambria Math" panose="02040503050406030204" pitchFamily="18" charset="0"/>
+                        </a:rPr>
+                        <m:t>𝑐</m:t>
+                      </m:r>
+                    </m:oMath>
+                  </m:oMathPara>
+                </a14:m>
+                <a:endParaRPr lang="en-US" altLang="ko-KR" dirty="0"/>
+              </a:p>
+              <a:p>
+                <a14:m>
+                  <m:oMathPara xmlns:m="http://schemas.openxmlformats.org/officeDocument/2006/math">
+                    <m:oMathParaPr>
+                      <m:jc m:val="centerGroup"/>
+                    </m:oMathParaPr>
+                    <m:oMath xmlns:m="http://schemas.openxmlformats.org/officeDocument/2006/math">
+                      <m:r>
+                        <a:rPr lang="en-US" altLang="ko-KR" b="0" i="1" smtClean="0">
+                          <a:latin typeface="Cambria Math" panose="02040503050406030204" pitchFamily="18" charset="0"/>
+                        </a:rPr>
+                        <m:t>𝑎</m:t>
+                      </m:r>
+                      <m:r>
+                        <a:rPr lang="en-US" altLang="ko-KR" b="0" i="1" smtClean="0">
+                          <a:latin typeface="Cambria Math" panose="02040503050406030204" pitchFamily="18" charset="0"/>
+                        </a:rPr>
+                        <m:t>&lt;0</m:t>
+                      </m:r>
+                    </m:oMath>
+                  </m:oMathPara>
+                </a14:m>
+                <a:endParaRPr lang="ko-KR" altLang="en-US" dirty="0"/>
+              </a:p>
+            </p:txBody>
+          </p:sp>
+        </mc:Choice>
+        <mc:Fallback>
+          <p:sp>
+            <p:nvSpPr>
+              <p:cNvPr id="32" name="TextBox 31">
+                <a:extLst>
+                  <a:ext uri="{FF2B5EF4-FFF2-40B4-BE49-F238E27FC236}">
+                    <a16:creationId xmlns:a16="http://schemas.microsoft.com/office/drawing/2014/main" id="{E0DE37FF-96FE-4A02-84BB-76AF4982698A}"/>
+                  </a:ext>
+                </a:extLst>
+              </p:cNvPr>
+              <p:cNvSpPr txBox="1">
+                <a:spLocks noRot="1" noChangeAspect="1" noMove="1" noResize="1" noEditPoints="1" noAdjustHandles="1" noChangeArrowheads="1" noChangeShapeType="1" noTextEdit="1"/>
+              </p:cNvSpPr>
+              <p:nvPr/>
+            </p:nvSpPr>
+            <p:spPr>
+              <a:xfrm>
+                <a:off x="10013973" y="4099612"/>
+                <a:ext cx="1617128" cy="646331"/>
+              </a:xfrm>
+              <a:prstGeom prst="rect">
+                <a:avLst/>
+              </a:prstGeom>
+              <a:blipFill>
+                <a:blip r:embed="rId20"/>
+                <a:stretch>
+                  <a:fillRect/>
+                </a:stretch>
+              </a:blipFill>
+            </p:spPr>
+            <p:txBody>
+              <a:bodyPr/>
+              <a:lstStyle/>
+              <a:p>
+                <a:r>
+                  <a:rPr lang="ko-KR" altLang="en-US">
+                    <a:noFill/>
+                  </a:rPr>
+                  <a:t> </a:t>
+                </a:r>
+              </a:p>
+            </p:txBody>
+          </p:sp>
+        </mc:Fallback>
+      </mc:AlternateContent>
+    </p:spTree>
+    <p:extLst>
+      <p:ext uri="{BB962C8B-B14F-4D97-AF65-F5344CB8AC3E}">
+        <p14:creationId xmlns:p14="http://schemas.microsoft.com/office/powerpoint/2010/main" val="3333172966"/>
+      </p:ext>
+    </p:extLst>
+  </p:cSld>
+  <p:clrMapOvr>
+    <a:masterClrMapping/>
+  </p:clrMapOvr>
+</p:sld>
+</file>
+
+<file path=ppt/slides/slide16.xml><?xml version="1.0" encoding="utf-8"?>
+<p:sld xmlns:a="http://schemas.openxmlformats.org/drawingml/2006/main" xmlns:r="http://schemas.openxmlformats.org/officeDocument/2006/relationships" xmlns:p="http://schemas.openxmlformats.org/presentationml/2006/main">
+  <p:cSld>
+    <p:spTree>
+      <p:nvGrpSpPr>
+        <p:cNvPr id="1" name=""/>
+        <p:cNvGrpSpPr/>
+        <p:nvPr/>
+      </p:nvGrpSpPr>
+      <p:grpSpPr>
+        <a:xfrm>
+          <a:off x="0" y="0"/>
+          <a:ext cx="0" cy="0"/>
+          <a:chOff x="0" y="0"/>
+          <a:chExt cx="0" cy="0"/>
+        </a:xfrm>
+      </p:grpSpPr>
+      <p:pic>
+        <p:nvPicPr>
+          <p:cNvPr id="34" name="그림 33">
+            <a:extLst>
+              <a:ext uri="{FF2B5EF4-FFF2-40B4-BE49-F238E27FC236}">
+                <a16:creationId xmlns:a16="http://schemas.microsoft.com/office/drawing/2014/main" id="{8FA1FCA7-6656-4EEC-9313-0969D804297B}"/>
+              </a:ext>
+            </a:extLst>
+          </p:cNvPr>
+          <p:cNvPicPr>
+            <a:picLocks noChangeAspect="1"/>
+          </p:cNvPicPr>
+          <p:nvPr/>
+        </p:nvPicPr>
+        <p:blipFill>
+          <a:blip r:embed="rId2"/>
+          <a:stretch>
+            <a:fillRect/>
+          </a:stretch>
+        </p:blipFill>
+        <p:spPr>
+          <a:xfrm>
+            <a:off x="2779986" y="399102"/>
+            <a:ext cx="6632028" cy="6059796"/>
+          </a:xfrm>
+          <a:prstGeom prst="rect">
+            <a:avLst/>
+          </a:prstGeom>
+        </p:spPr>
+      </p:pic>
+      <mc:AlternateContent xmlns:mc="http://schemas.openxmlformats.org/markup-compatibility/2006">
+        <mc:Choice xmlns:a14="http://schemas.microsoft.com/office/drawing/2010/main" Requires="a14">
+          <p:sp>
+            <p:nvSpPr>
+              <p:cNvPr id="36" name="TextBox 35">
+                <a:extLst>
+                  <a:ext uri="{FF2B5EF4-FFF2-40B4-BE49-F238E27FC236}">
+                    <a16:creationId xmlns:a16="http://schemas.microsoft.com/office/drawing/2014/main" id="{FC898518-C933-4039-91B9-D7A24977F968}"/>
+                  </a:ext>
+                </a:extLst>
+              </p:cNvPr>
+              <p:cNvSpPr txBox="1"/>
+              <p:nvPr/>
+            </p:nvSpPr>
+            <p:spPr>
+              <a:xfrm>
+                <a:off x="6464898" y="3546746"/>
+                <a:ext cx="622738" cy="400110"/>
+              </a:xfrm>
+              <a:prstGeom prst="rect">
+                <a:avLst/>
+              </a:prstGeom>
+              <a:noFill/>
+            </p:spPr>
+            <p:txBody>
+              <a:bodyPr wrap="square" rtlCol="0">
+                <a:spAutoFit/>
+              </a:bodyPr>
+              <a:lstStyle/>
+              <a:p>
+                <a:pPr/>
+                <a14:m>
+                  <m:oMathPara xmlns:m="http://schemas.openxmlformats.org/officeDocument/2006/math">
+                    <m:oMathParaPr>
+                      <m:jc m:val="centerGroup"/>
+                    </m:oMathParaPr>
+                    <m:oMath xmlns:m="http://schemas.openxmlformats.org/officeDocument/2006/math">
+                      <m:r>
+                        <a:rPr lang="en-US" altLang="ko-KR" sz="2000" b="0" i="1" smtClean="0">
+                          <a:latin typeface="Cambria Math" panose="02040503050406030204" pitchFamily="18" charset="0"/>
+                        </a:rPr>
+                        <m:t>𝑂</m:t>
+                      </m:r>
+                    </m:oMath>
+                  </m:oMathPara>
+                </a14:m>
+                <a:endParaRPr lang="ko-KR" altLang="en-US" sz="2000" dirty="0"/>
+              </a:p>
+            </p:txBody>
+          </p:sp>
+        </mc:Choice>
+        <mc:Fallback>
+          <p:sp>
+            <p:nvSpPr>
+              <p:cNvPr id="36" name="TextBox 35">
+                <a:extLst>
+                  <a:ext uri="{FF2B5EF4-FFF2-40B4-BE49-F238E27FC236}">
+                    <a16:creationId xmlns:a16="http://schemas.microsoft.com/office/drawing/2014/main" id="{FC898518-C933-4039-91B9-D7A24977F968}"/>
+                  </a:ext>
+                </a:extLst>
+              </p:cNvPr>
+              <p:cNvSpPr txBox="1">
+                <a:spLocks noRot="1" noChangeAspect="1" noMove="1" noResize="1" noEditPoints="1" noAdjustHandles="1" noChangeArrowheads="1" noChangeShapeType="1" noTextEdit="1"/>
+              </p:cNvSpPr>
+              <p:nvPr/>
+            </p:nvSpPr>
+            <p:spPr>
+              <a:xfrm>
+                <a:off x="6464898" y="3546746"/>
+                <a:ext cx="622738" cy="400110"/>
+              </a:xfrm>
+              <a:prstGeom prst="rect">
+                <a:avLst/>
+              </a:prstGeom>
+              <a:blipFill>
+                <a:blip r:embed="rId3"/>
+                <a:stretch>
+                  <a:fillRect/>
+                </a:stretch>
+              </a:blipFill>
+            </p:spPr>
+            <p:txBody>
+              <a:bodyPr/>
+              <a:lstStyle/>
+              <a:p>
+                <a:r>
+                  <a:rPr lang="ko-KR" altLang="en-US">
+                    <a:noFill/>
+                  </a:rPr>
+                  <a:t> </a:t>
+                </a:r>
+              </a:p>
+            </p:txBody>
+          </p:sp>
+        </mc:Fallback>
+      </mc:AlternateContent>
+      <mc:AlternateContent xmlns:mc="http://schemas.openxmlformats.org/markup-compatibility/2006">
+        <mc:Choice xmlns:a14="http://schemas.microsoft.com/office/drawing/2010/main" Requires="a14">
+          <p:sp>
+            <p:nvSpPr>
+              <p:cNvPr id="37" name="TextBox 36">
+                <a:extLst>
+                  <a:ext uri="{FF2B5EF4-FFF2-40B4-BE49-F238E27FC236}">
+                    <a16:creationId xmlns:a16="http://schemas.microsoft.com/office/drawing/2014/main" id="{3D13CDCB-137D-4A9B-A899-482D2E314AFA}"/>
+                  </a:ext>
+                </a:extLst>
+              </p:cNvPr>
+              <p:cNvSpPr txBox="1"/>
+              <p:nvPr/>
+            </p:nvSpPr>
+            <p:spPr>
+              <a:xfrm>
+                <a:off x="9014110" y="3485712"/>
+                <a:ext cx="622738" cy="400110"/>
+              </a:xfrm>
+              <a:prstGeom prst="rect">
+                <a:avLst/>
+              </a:prstGeom>
+              <a:noFill/>
+            </p:spPr>
+            <p:txBody>
+              <a:bodyPr wrap="square" rtlCol="0">
+                <a:spAutoFit/>
+              </a:bodyPr>
+              <a:lstStyle/>
+              <a:p>
+                <a:pPr/>
+                <a14:m>
+                  <m:oMathPara xmlns:m="http://schemas.openxmlformats.org/officeDocument/2006/math">
+                    <m:oMathParaPr>
+                      <m:jc m:val="centerGroup"/>
+                    </m:oMathParaPr>
+                    <m:oMath xmlns:m="http://schemas.openxmlformats.org/officeDocument/2006/math">
+                      <m:r>
+                        <a:rPr lang="en-US" altLang="ko-KR" sz="2000" b="0" i="1" smtClean="0">
+                          <a:latin typeface="Cambria Math" panose="02040503050406030204" pitchFamily="18" charset="0"/>
+                        </a:rPr>
+                        <m:t>𝑥</m:t>
+                      </m:r>
+                    </m:oMath>
+                  </m:oMathPara>
+                </a14:m>
+                <a:endParaRPr lang="ko-KR" altLang="en-US" sz="2000" dirty="0"/>
+              </a:p>
+            </p:txBody>
+          </p:sp>
+        </mc:Choice>
+        <mc:Fallback>
+          <p:sp>
+            <p:nvSpPr>
+              <p:cNvPr id="37" name="TextBox 36">
+                <a:extLst>
+                  <a:ext uri="{FF2B5EF4-FFF2-40B4-BE49-F238E27FC236}">
+                    <a16:creationId xmlns:a16="http://schemas.microsoft.com/office/drawing/2014/main" id="{3D13CDCB-137D-4A9B-A899-482D2E314AFA}"/>
+                  </a:ext>
+                </a:extLst>
+              </p:cNvPr>
+              <p:cNvSpPr txBox="1">
+                <a:spLocks noRot="1" noChangeAspect="1" noMove="1" noResize="1" noEditPoints="1" noAdjustHandles="1" noChangeArrowheads="1" noChangeShapeType="1" noTextEdit="1"/>
+              </p:cNvSpPr>
+              <p:nvPr/>
+            </p:nvSpPr>
+            <p:spPr>
+              <a:xfrm>
+                <a:off x="9014110" y="3485712"/>
+                <a:ext cx="622738" cy="400110"/>
+              </a:xfrm>
+              <a:prstGeom prst="rect">
+                <a:avLst/>
+              </a:prstGeom>
+              <a:blipFill>
+                <a:blip r:embed="rId4"/>
+                <a:stretch>
+                  <a:fillRect/>
+                </a:stretch>
+              </a:blipFill>
+            </p:spPr>
+            <p:txBody>
+              <a:bodyPr/>
+              <a:lstStyle/>
+              <a:p>
+                <a:r>
+                  <a:rPr lang="ko-KR" altLang="en-US">
+                    <a:noFill/>
+                  </a:rPr>
+                  <a:t> </a:t>
+                </a:r>
+              </a:p>
+            </p:txBody>
+          </p:sp>
+        </mc:Fallback>
+      </mc:AlternateContent>
+      <mc:AlternateContent xmlns:mc="http://schemas.openxmlformats.org/markup-compatibility/2006">
+        <mc:Choice xmlns:a14="http://schemas.microsoft.com/office/drawing/2010/main" Requires="a14">
+          <p:sp>
+            <p:nvSpPr>
+              <p:cNvPr id="38" name="TextBox 37">
+                <a:extLst>
+                  <a:ext uri="{FF2B5EF4-FFF2-40B4-BE49-F238E27FC236}">
+                    <a16:creationId xmlns:a16="http://schemas.microsoft.com/office/drawing/2014/main" id="{78E18D3D-DF01-4F5E-976A-BEE503560B72}"/>
+                  </a:ext>
+                </a:extLst>
+              </p:cNvPr>
+              <p:cNvSpPr txBox="1"/>
+              <p:nvPr/>
+            </p:nvSpPr>
+            <p:spPr>
+              <a:xfrm>
+                <a:off x="6160551" y="252138"/>
+                <a:ext cx="622738" cy="400110"/>
+              </a:xfrm>
+              <a:prstGeom prst="rect">
+                <a:avLst/>
+              </a:prstGeom>
+              <a:noFill/>
+            </p:spPr>
+            <p:txBody>
+              <a:bodyPr wrap="square" rtlCol="0">
+                <a:spAutoFit/>
+              </a:bodyPr>
+              <a:lstStyle/>
+              <a:p>
+                <a:pPr/>
+                <a14:m>
+                  <m:oMathPara xmlns:m="http://schemas.openxmlformats.org/officeDocument/2006/math">
+                    <m:oMathParaPr>
+                      <m:jc m:val="centerGroup"/>
+                    </m:oMathParaPr>
+                    <m:oMath xmlns:m="http://schemas.openxmlformats.org/officeDocument/2006/math">
+                      <m:r>
+                        <a:rPr lang="en-US" altLang="ko-KR" sz="2000" b="0" i="1" smtClean="0">
+                          <a:latin typeface="Cambria Math" panose="02040503050406030204" pitchFamily="18" charset="0"/>
+                        </a:rPr>
+                        <m:t>𝑦</m:t>
+                      </m:r>
+                    </m:oMath>
+                  </m:oMathPara>
+                </a14:m>
+                <a:endParaRPr lang="ko-KR" altLang="en-US" sz="2000" dirty="0"/>
+              </a:p>
+            </p:txBody>
+          </p:sp>
+        </mc:Choice>
+        <mc:Fallback>
+          <p:sp>
+            <p:nvSpPr>
+              <p:cNvPr id="38" name="TextBox 37">
+                <a:extLst>
+                  <a:ext uri="{FF2B5EF4-FFF2-40B4-BE49-F238E27FC236}">
+                    <a16:creationId xmlns:a16="http://schemas.microsoft.com/office/drawing/2014/main" id="{78E18D3D-DF01-4F5E-976A-BEE503560B72}"/>
+                  </a:ext>
+                </a:extLst>
+              </p:cNvPr>
+              <p:cNvSpPr txBox="1">
+                <a:spLocks noRot="1" noChangeAspect="1" noMove="1" noResize="1" noEditPoints="1" noAdjustHandles="1" noChangeArrowheads="1" noChangeShapeType="1" noTextEdit="1"/>
+              </p:cNvSpPr>
+              <p:nvPr/>
+            </p:nvSpPr>
+            <p:spPr>
+              <a:xfrm>
+                <a:off x="6160551" y="252138"/>
+                <a:ext cx="622738" cy="400110"/>
+              </a:xfrm>
+              <a:prstGeom prst="rect">
+                <a:avLst/>
+              </a:prstGeom>
+              <a:blipFill>
+                <a:blip r:embed="rId5"/>
+                <a:stretch>
+                  <a:fillRect b="-10606"/>
+                </a:stretch>
+              </a:blipFill>
+            </p:spPr>
+            <p:txBody>
+              <a:bodyPr/>
+              <a:lstStyle/>
+              <a:p>
+                <a:r>
+                  <a:rPr lang="ko-KR" altLang="en-US">
+                    <a:noFill/>
+                  </a:rPr>
+                  <a:t> </a:t>
+                </a:r>
+              </a:p>
+            </p:txBody>
+          </p:sp>
+        </mc:Fallback>
+      </mc:AlternateContent>
+      <p:cxnSp>
+        <p:nvCxnSpPr>
+          <p:cNvPr id="40" name="직선 연결선 39">
+            <a:extLst>
+              <a:ext uri="{FF2B5EF4-FFF2-40B4-BE49-F238E27FC236}">
+                <a16:creationId xmlns:a16="http://schemas.microsoft.com/office/drawing/2014/main" id="{FBEF913F-2D7C-4904-8782-85BFC30B3401}"/>
+              </a:ext>
+            </a:extLst>
+          </p:cNvPr>
+          <p:cNvCxnSpPr>
+            <a:cxnSpLocks/>
+          </p:cNvCxnSpPr>
+          <p:nvPr/>
+        </p:nvCxnSpPr>
+        <p:spPr>
+          <a:xfrm>
+            <a:off x="3108347" y="3563007"/>
+            <a:ext cx="0" cy="2319750"/>
+          </a:xfrm>
+          <a:prstGeom prst="line">
+            <a:avLst/>
+          </a:prstGeom>
+          <a:ln>
+            <a:solidFill>
+              <a:schemeClr val="bg1">
+                <a:lumMod val="50000"/>
+              </a:schemeClr>
+            </a:solidFill>
+            <a:prstDash val="dash"/>
+          </a:ln>
+        </p:spPr>
+        <p:style>
+          <a:lnRef idx="1">
+            <a:schemeClr val="accent1"/>
+          </a:lnRef>
+          <a:fillRef idx="0">
+            <a:schemeClr val="accent1"/>
+          </a:fillRef>
+          <a:effectRef idx="0">
+            <a:schemeClr val="accent1"/>
+          </a:effectRef>
+          <a:fontRef idx="minor">
+            <a:schemeClr val="tx1"/>
+          </a:fontRef>
+        </p:style>
+      </p:cxnSp>
+      <mc:AlternateContent xmlns:mc="http://schemas.openxmlformats.org/markup-compatibility/2006">
+        <mc:Choice xmlns:a14="http://schemas.microsoft.com/office/drawing/2010/main" Requires="a14">
+          <p:sp>
+            <p:nvSpPr>
+              <p:cNvPr id="41" name="TextBox 40">
+                <a:extLst>
+                  <a:ext uri="{FF2B5EF4-FFF2-40B4-BE49-F238E27FC236}">
+                    <a16:creationId xmlns:a16="http://schemas.microsoft.com/office/drawing/2014/main" id="{A02DED21-800F-41C0-902E-3F781D31000B}"/>
+                  </a:ext>
+                </a:extLst>
+              </p:cNvPr>
+              <p:cNvSpPr txBox="1"/>
+              <p:nvPr/>
+            </p:nvSpPr>
+            <p:spPr>
+              <a:xfrm>
+                <a:off x="6533775" y="4498721"/>
+                <a:ext cx="622738" cy="400110"/>
+              </a:xfrm>
+              <a:prstGeom prst="rect">
+                <a:avLst/>
+              </a:prstGeom>
+              <a:noFill/>
+            </p:spPr>
+            <p:txBody>
+              <a:bodyPr wrap="square" rtlCol="0">
+                <a:spAutoFit/>
+              </a:bodyPr>
+              <a:lstStyle/>
+              <a:p>
+                <a:pPr/>
+                <a14:m>
+                  <m:oMathPara xmlns:m="http://schemas.openxmlformats.org/officeDocument/2006/math">
+                    <m:oMathParaPr>
+                      <m:jc m:val="centerGroup"/>
+                    </m:oMathParaPr>
+                    <m:oMath xmlns:m="http://schemas.openxmlformats.org/officeDocument/2006/math">
+                      <m:r>
+                        <a:rPr lang="en-US" altLang="ko-KR" sz="2000" b="0" i="1" smtClean="0">
+                          <a:latin typeface="Cambria Math" panose="02040503050406030204" pitchFamily="18" charset="0"/>
+                        </a:rPr>
+                        <m:t>−1</m:t>
+                      </m:r>
+                    </m:oMath>
+                  </m:oMathPara>
+                </a14:m>
+                <a:endParaRPr lang="ko-KR" altLang="en-US" sz="2000" dirty="0"/>
+              </a:p>
+            </p:txBody>
+          </p:sp>
+        </mc:Choice>
+        <mc:Fallback>
+          <p:sp>
+            <p:nvSpPr>
+              <p:cNvPr id="41" name="TextBox 40">
+                <a:extLst>
+                  <a:ext uri="{FF2B5EF4-FFF2-40B4-BE49-F238E27FC236}">
+                    <a16:creationId xmlns:a16="http://schemas.microsoft.com/office/drawing/2014/main" id="{A02DED21-800F-41C0-902E-3F781D31000B}"/>
+                  </a:ext>
+                </a:extLst>
+              </p:cNvPr>
+              <p:cNvSpPr txBox="1">
+                <a:spLocks noRot="1" noChangeAspect="1" noMove="1" noResize="1" noEditPoints="1" noAdjustHandles="1" noChangeArrowheads="1" noChangeShapeType="1" noTextEdit="1"/>
+              </p:cNvSpPr>
+              <p:nvPr/>
+            </p:nvSpPr>
+            <p:spPr>
+              <a:xfrm>
+                <a:off x="6533775" y="4498721"/>
+                <a:ext cx="622738" cy="400110"/>
+              </a:xfrm>
+              <a:prstGeom prst="rect">
+                <a:avLst/>
+              </a:prstGeom>
+              <a:blipFill>
+                <a:blip r:embed="rId6"/>
+                <a:stretch>
+                  <a:fillRect/>
+                </a:stretch>
+              </a:blipFill>
+            </p:spPr>
+            <p:txBody>
+              <a:bodyPr/>
+              <a:lstStyle/>
+              <a:p>
+                <a:r>
+                  <a:rPr lang="ko-KR" altLang="en-US">
+                    <a:noFill/>
+                  </a:rPr>
+                  <a:t> </a:t>
+                </a:r>
+              </a:p>
+            </p:txBody>
+          </p:sp>
+        </mc:Fallback>
+      </mc:AlternateContent>
+      <mc:AlternateContent xmlns:mc="http://schemas.openxmlformats.org/markup-compatibility/2006">
+        <mc:Choice xmlns:a14="http://schemas.microsoft.com/office/drawing/2010/main" Requires="a14">
+          <p:sp>
+            <p:nvSpPr>
+              <p:cNvPr id="43" name="TextBox 42">
+                <a:extLst>
+                  <a:ext uri="{FF2B5EF4-FFF2-40B4-BE49-F238E27FC236}">
+                    <a16:creationId xmlns:a16="http://schemas.microsoft.com/office/drawing/2014/main" id="{1A58D464-3F5D-4667-B4AB-FDAED11C6FB6}"/>
+                  </a:ext>
+                </a:extLst>
+              </p:cNvPr>
+              <p:cNvSpPr txBox="1"/>
+              <p:nvPr/>
+            </p:nvSpPr>
+            <p:spPr>
+              <a:xfrm>
+                <a:off x="7461968" y="3509916"/>
+                <a:ext cx="622738" cy="400110"/>
+              </a:xfrm>
+              <a:prstGeom prst="rect">
+                <a:avLst/>
+              </a:prstGeom>
+              <a:noFill/>
+            </p:spPr>
+            <p:txBody>
+              <a:bodyPr wrap="square" rtlCol="0">
+                <a:spAutoFit/>
+              </a:bodyPr>
+              <a:lstStyle/>
+              <a:p>
+                <a:pPr/>
+                <a14:m>
+                  <m:oMathPara xmlns:m="http://schemas.openxmlformats.org/officeDocument/2006/math">
+                    <m:oMathParaPr>
+                      <m:jc m:val="centerGroup"/>
+                    </m:oMathParaPr>
+                    <m:oMath xmlns:m="http://schemas.openxmlformats.org/officeDocument/2006/math">
+                      <m:r>
+                        <a:rPr lang="en-US" altLang="ko-KR" sz="2000" b="0" i="1" smtClean="0">
+                          <a:latin typeface="Cambria Math" panose="02040503050406030204" pitchFamily="18" charset="0"/>
+                        </a:rPr>
+                        <m:t>1</m:t>
+                      </m:r>
+                    </m:oMath>
+                  </m:oMathPara>
+                </a14:m>
+                <a:endParaRPr lang="ko-KR" altLang="en-US" sz="2000" dirty="0"/>
+              </a:p>
+            </p:txBody>
+          </p:sp>
+        </mc:Choice>
+        <mc:Fallback>
+          <p:sp>
+            <p:nvSpPr>
+              <p:cNvPr id="43" name="TextBox 42">
+                <a:extLst>
+                  <a:ext uri="{FF2B5EF4-FFF2-40B4-BE49-F238E27FC236}">
+                    <a16:creationId xmlns:a16="http://schemas.microsoft.com/office/drawing/2014/main" id="{1A58D464-3F5D-4667-B4AB-FDAED11C6FB6}"/>
+                  </a:ext>
+                </a:extLst>
+              </p:cNvPr>
+              <p:cNvSpPr txBox="1">
+                <a:spLocks noRot="1" noChangeAspect="1" noMove="1" noResize="1" noEditPoints="1" noAdjustHandles="1" noChangeArrowheads="1" noChangeShapeType="1" noTextEdit="1"/>
+              </p:cNvSpPr>
+              <p:nvPr/>
+            </p:nvSpPr>
+            <p:spPr>
+              <a:xfrm>
+                <a:off x="7461968" y="3509916"/>
+                <a:ext cx="622738" cy="400110"/>
+              </a:xfrm>
+              <a:prstGeom prst="rect">
+                <a:avLst/>
+              </a:prstGeom>
+              <a:blipFill>
+                <a:blip r:embed="rId7"/>
+                <a:stretch>
+                  <a:fillRect/>
+                </a:stretch>
+              </a:blipFill>
+            </p:spPr>
+            <p:txBody>
+              <a:bodyPr/>
+              <a:lstStyle/>
+              <a:p>
+                <a:r>
+                  <a:rPr lang="ko-KR" altLang="en-US">
+                    <a:noFill/>
+                  </a:rPr>
+                  <a:t> </a:t>
+                </a:r>
+              </a:p>
+            </p:txBody>
+          </p:sp>
+        </mc:Fallback>
+      </mc:AlternateContent>
+      <p:cxnSp>
+        <p:nvCxnSpPr>
+          <p:cNvPr id="44" name="직선 연결선 43">
+            <a:extLst>
+              <a:ext uri="{FF2B5EF4-FFF2-40B4-BE49-F238E27FC236}">
+                <a16:creationId xmlns:a16="http://schemas.microsoft.com/office/drawing/2014/main" id="{33BE8F69-DA15-4CD9-9D68-A22A115F1340}"/>
+              </a:ext>
+            </a:extLst>
+          </p:cNvPr>
+          <p:cNvCxnSpPr>
+            <a:cxnSpLocks/>
+          </p:cNvCxnSpPr>
+          <p:nvPr/>
+        </p:nvCxnSpPr>
+        <p:spPr>
+          <a:xfrm>
+            <a:off x="5481028" y="4722882"/>
+            <a:ext cx="1131818" cy="0"/>
+          </a:xfrm>
+          <a:prstGeom prst="line">
+            <a:avLst/>
+          </a:prstGeom>
+          <a:ln>
+            <a:solidFill>
+              <a:schemeClr val="bg1">
+                <a:lumMod val="50000"/>
+              </a:schemeClr>
+            </a:solidFill>
+            <a:prstDash val="dash"/>
+          </a:ln>
+        </p:spPr>
+        <p:style>
+          <a:lnRef idx="1">
+            <a:schemeClr val="accent1"/>
+          </a:lnRef>
+          <a:fillRef idx="0">
+            <a:schemeClr val="accent1"/>
+          </a:fillRef>
+          <a:effectRef idx="0">
+            <a:schemeClr val="accent1"/>
+          </a:effectRef>
+          <a:fontRef idx="minor">
+            <a:schemeClr val="tx1"/>
+          </a:fontRef>
+        </p:style>
+      </p:cxnSp>
+      <mc:AlternateContent xmlns:mc="http://schemas.openxmlformats.org/markup-compatibility/2006">
+        <mc:Choice xmlns:a14="http://schemas.microsoft.com/office/drawing/2010/main" Requires="a14">
+          <p:sp>
+            <p:nvSpPr>
+              <p:cNvPr id="47" name="TextBox 46">
+                <a:extLst>
+                  <a:ext uri="{FF2B5EF4-FFF2-40B4-BE49-F238E27FC236}">
+                    <a16:creationId xmlns:a16="http://schemas.microsoft.com/office/drawing/2014/main" id="{2C7E4ADA-E311-4FD4-B6EB-3E129CF0BB76}"/>
+                  </a:ext>
+                </a:extLst>
+              </p:cNvPr>
+              <p:cNvSpPr txBox="1"/>
+              <p:nvPr/>
+            </p:nvSpPr>
+            <p:spPr>
+              <a:xfrm>
+                <a:off x="5143543" y="3069934"/>
+                <a:ext cx="622738" cy="400110"/>
+              </a:xfrm>
+              <a:prstGeom prst="rect">
+                <a:avLst/>
+              </a:prstGeom>
+              <a:noFill/>
+            </p:spPr>
+            <p:txBody>
+              <a:bodyPr wrap="square" rtlCol="0">
+                <a:spAutoFit/>
+              </a:bodyPr>
+              <a:lstStyle/>
+              <a:p>
+                <a:pPr/>
+                <a14:m>
+                  <m:oMathPara xmlns:m="http://schemas.openxmlformats.org/officeDocument/2006/math">
+                    <m:oMathParaPr>
+                      <m:jc m:val="centerGroup"/>
+                    </m:oMathParaPr>
+                    <m:oMath xmlns:m="http://schemas.openxmlformats.org/officeDocument/2006/math">
+                      <m:r>
+                        <a:rPr lang="en-US" altLang="ko-KR" sz="2000" b="0" i="1" smtClean="0">
+                          <a:latin typeface="Cambria Math" panose="02040503050406030204" pitchFamily="18" charset="0"/>
+                        </a:rPr>
+                        <m:t>−1</m:t>
+                      </m:r>
+                    </m:oMath>
+                  </m:oMathPara>
+                </a14:m>
+                <a:endParaRPr lang="ko-KR" altLang="en-US" sz="2000" dirty="0"/>
+              </a:p>
+            </p:txBody>
+          </p:sp>
+        </mc:Choice>
+        <mc:Fallback>
+          <p:sp>
+            <p:nvSpPr>
+              <p:cNvPr id="47" name="TextBox 46">
+                <a:extLst>
+                  <a:ext uri="{FF2B5EF4-FFF2-40B4-BE49-F238E27FC236}">
+                    <a16:creationId xmlns:a16="http://schemas.microsoft.com/office/drawing/2014/main" id="{2C7E4ADA-E311-4FD4-B6EB-3E129CF0BB76}"/>
+                  </a:ext>
+                </a:extLst>
+              </p:cNvPr>
+              <p:cNvSpPr txBox="1">
+                <a:spLocks noRot="1" noChangeAspect="1" noMove="1" noResize="1" noEditPoints="1" noAdjustHandles="1" noChangeArrowheads="1" noChangeShapeType="1" noTextEdit="1"/>
+              </p:cNvSpPr>
+              <p:nvPr/>
+            </p:nvSpPr>
+            <p:spPr>
+              <a:xfrm>
+                <a:off x="5143543" y="3069934"/>
+                <a:ext cx="622738" cy="400110"/>
+              </a:xfrm>
+              <a:prstGeom prst="rect">
+                <a:avLst/>
+              </a:prstGeom>
+              <a:blipFill>
+                <a:blip r:embed="rId8"/>
+                <a:stretch>
+                  <a:fillRect/>
+                </a:stretch>
+              </a:blipFill>
+            </p:spPr>
+            <p:txBody>
+              <a:bodyPr/>
+              <a:lstStyle/>
+              <a:p>
+                <a:r>
+                  <a:rPr lang="ko-KR" altLang="en-US">
+                    <a:noFill/>
+                  </a:rPr>
+                  <a:t> </a:t>
+                </a:r>
+              </a:p>
+            </p:txBody>
+          </p:sp>
+        </mc:Fallback>
+      </mc:AlternateContent>
+      <mc:AlternateContent xmlns:mc="http://schemas.openxmlformats.org/markup-compatibility/2006">
+        <mc:Choice xmlns:a14="http://schemas.microsoft.com/office/drawing/2010/main" Requires="a14">
+          <p:sp>
+            <p:nvSpPr>
+              <p:cNvPr id="48" name="TextBox 47">
+                <a:extLst>
+                  <a:ext uri="{FF2B5EF4-FFF2-40B4-BE49-F238E27FC236}">
+                    <a16:creationId xmlns:a16="http://schemas.microsoft.com/office/drawing/2014/main" id="{804484D4-18E8-4D23-9343-FB22D5DA40BF}"/>
+                  </a:ext>
+                </a:extLst>
+              </p:cNvPr>
+              <p:cNvSpPr txBox="1"/>
+              <p:nvPr/>
+            </p:nvSpPr>
+            <p:spPr>
+              <a:xfrm>
+                <a:off x="6153529" y="2160882"/>
+                <a:ext cx="622738" cy="400110"/>
+              </a:xfrm>
+              <a:prstGeom prst="rect">
+                <a:avLst/>
+              </a:prstGeom>
+              <a:noFill/>
+            </p:spPr>
+            <p:txBody>
+              <a:bodyPr wrap="square" rtlCol="0">
+                <a:spAutoFit/>
+              </a:bodyPr>
+              <a:lstStyle/>
+              <a:p>
+                <a:pPr/>
+                <a14:m>
+                  <m:oMathPara xmlns:m="http://schemas.openxmlformats.org/officeDocument/2006/math">
+                    <m:oMathParaPr>
+                      <m:jc m:val="centerGroup"/>
+                    </m:oMathParaPr>
+                    <m:oMath xmlns:m="http://schemas.openxmlformats.org/officeDocument/2006/math">
+                      <m:r>
+                        <a:rPr lang="en-US" altLang="ko-KR" sz="2000" b="0" i="1" smtClean="0">
+                          <a:latin typeface="Cambria Math" panose="02040503050406030204" pitchFamily="18" charset="0"/>
+                        </a:rPr>
+                        <m:t>1</m:t>
+                      </m:r>
+                    </m:oMath>
+                  </m:oMathPara>
+                </a14:m>
+                <a:endParaRPr lang="ko-KR" altLang="en-US" sz="2000" dirty="0"/>
+              </a:p>
+            </p:txBody>
+          </p:sp>
+        </mc:Choice>
+        <mc:Fallback>
+          <p:sp>
+            <p:nvSpPr>
+              <p:cNvPr id="48" name="TextBox 47">
+                <a:extLst>
+                  <a:ext uri="{FF2B5EF4-FFF2-40B4-BE49-F238E27FC236}">
+                    <a16:creationId xmlns:a16="http://schemas.microsoft.com/office/drawing/2014/main" id="{804484D4-18E8-4D23-9343-FB22D5DA40BF}"/>
+                  </a:ext>
+                </a:extLst>
+              </p:cNvPr>
+              <p:cNvSpPr txBox="1">
+                <a:spLocks noRot="1" noChangeAspect="1" noMove="1" noResize="1" noEditPoints="1" noAdjustHandles="1" noChangeArrowheads="1" noChangeShapeType="1" noTextEdit="1"/>
+              </p:cNvSpPr>
+              <p:nvPr/>
+            </p:nvSpPr>
+            <p:spPr>
+              <a:xfrm>
+                <a:off x="6153529" y="2160882"/>
+                <a:ext cx="622738" cy="400110"/>
+              </a:xfrm>
+              <a:prstGeom prst="rect">
+                <a:avLst/>
+              </a:prstGeom>
+              <a:blipFill>
+                <a:blip r:embed="rId9"/>
+                <a:stretch>
+                  <a:fillRect/>
+                </a:stretch>
+              </a:blipFill>
+            </p:spPr>
+            <p:txBody>
+              <a:bodyPr/>
+              <a:lstStyle/>
+              <a:p>
+                <a:r>
+                  <a:rPr lang="ko-KR" altLang="en-US">
+                    <a:noFill/>
+                  </a:rPr>
+                  <a:t> </a:t>
+                </a:r>
+              </a:p>
+            </p:txBody>
+          </p:sp>
+        </mc:Fallback>
+      </mc:AlternateContent>
+      <p:cxnSp>
+        <p:nvCxnSpPr>
+          <p:cNvPr id="50" name="직선 연결선 49">
+            <a:extLst>
+              <a:ext uri="{FF2B5EF4-FFF2-40B4-BE49-F238E27FC236}">
+                <a16:creationId xmlns:a16="http://schemas.microsoft.com/office/drawing/2014/main" id="{79708AC2-053A-4D06-81C8-4CC379CC832B}"/>
+              </a:ext>
+            </a:extLst>
+          </p:cNvPr>
+          <p:cNvCxnSpPr>
+            <a:cxnSpLocks/>
+          </p:cNvCxnSpPr>
+          <p:nvPr/>
+        </p:nvCxnSpPr>
+        <p:spPr>
+          <a:xfrm>
+            <a:off x="4278934" y="3563007"/>
+            <a:ext cx="0" cy="2319750"/>
+          </a:xfrm>
+          <a:prstGeom prst="line">
+            <a:avLst/>
+          </a:prstGeom>
+          <a:ln>
+            <a:solidFill>
+              <a:schemeClr val="bg1">
+                <a:lumMod val="50000"/>
+              </a:schemeClr>
+            </a:solidFill>
+            <a:prstDash val="dash"/>
+          </a:ln>
+        </p:spPr>
+        <p:style>
+          <a:lnRef idx="1">
+            <a:schemeClr val="accent1"/>
+          </a:lnRef>
+          <a:fillRef idx="0">
+            <a:schemeClr val="accent1"/>
+          </a:fillRef>
+          <a:effectRef idx="0">
+            <a:schemeClr val="accent1"/>
+          </a:effectRef>
+          <a:fontRef idx="minor">
+            <a:schemeClr val="tx1"/>
+          </a:fontRef>
+        </p:style>
+      </p:cxnSp>
+      <p:cxnSp>
+        <p:nvCxnSpPr>
+          <p:cNvPr id="51" name="직선 연결선 50">
+            <a:extLst>
+              <a:ext uri="{FF2B5EF4-FFF2-40B4-BE49-F238E27FC236}">
+                <a16:creationId xmlns:a16="http://schemas.microsoft.com/office/drawing/2014/main" id="{295A8337-0B0D-49F8-9025-1E48FE3FCBF5}"/>
+              </a:ext>
+            </a:extLst>
+          </p:cNvPr>
+          <p:cNvCxnSpPr>
+            <a:cxnSpLocks/>
+          </p:cNvCxnSpPr>
+          <p:nvPr/>
+        </p:nvCxnSpPr>
+        <p:spPr>
+          <a:xfrm>
+            <a:off x="5445559" y="3563007"/>
+            <a:ext cx="0" cy="1119352"/>
+          </a:xfrm>
+          <a:prstGeom prst="line">
+            <a:avLst/>
+          </a:prstGeom>
+          <a:ln>
+            <a:solidFill>
+              <a:schemeClr val="bg1">
+                <a:lumMod val="50000"/>
+              </a:schemeClr>
+            </a:solidFill>
+            <a:prstDash val="dash"/>
+          </a:ln>
+        </p:spPr>
+        <p:style>
+          <a:lnRef idx="1">
+            <a:schemeClr val="accent1"/>
+          </a:lnRef>
+          <a:fillRef idx="0">
+            <a:schemeClr val="accent1"/>
+          </a:fillRef>
+          <a:effectRef idx="0">
+            <a:schemeClr val="accent1"/>
+          </a:effectRef>
+          <a:fontRef idx="minor">
+            <a:schemeClr val="tx1"/>
+          </a:fontRef>
+        </p:style>
+      </p:cxnSp>
+      <p:cxnSp>
+        <p:nvCxnSpPr>
+          <p:cNvPr id="54" name="직선 연결선 53">
+            <a:extLst>
+              <a:ext uri="{FF2B5EF4-FFF2-40B4-BE49-F238E27FC236}">
+                <a16:creationId xmlns:a16="http://schemas.microsoft.com/office/drawing/2014/main" id="{93D834C0-69F0-4F11-9ABB-2B8BE08368C0}"/>
+              </a:ext>
+            </a:extLst>
+          </p:cNvPr>
+          <p:cNvCxnSpPr>
+            <a:cxnSpLocks/>
+          </p:cNvCxnSpPr>
+          <p:nvPr/>
+        </p:nvCxnSpPr>
+        <p:spPr>
+          <a:xfrm>
+            <a:off x="4315460" y="5899019"/>
+            <a:ext cx="2297386" cy="0"/>
+          </a:xfrm>
+          <a:prstGeom prst="line">
+            <a:avLst/>
+          </a:prstGeom>
+          <a:ln>
+            <a:solidFill>
+              <a:schemeClr val="bg1">
+                <a:lumMod val="50000"/>
+              </a:schemeClr>
+            </a:solidFill>
+            <a:prstDash val="dash"/>
+          </a:ln>
+        </p:spPr>
+        <p:style>
+          <a:lnRef idx="1">
+            <a:schemeClr val="accent1"/>
+          </a:lnRef>
+          <a:fillRef idx="0">
+            <a:schemeClr val="accent1"/>
+          </a:fillRef>
+          <a:effectRef idx="0">
+            <a:schemeClr val="accent1"/>
+          </a:effectRef>
+          <a:fontRef idx="minor">
+            <a:schemeClr val="tx1"/>
+          </a:fontRef>
+        </p:style>
+      </p:cxnSp>
+      <p:cxnSp>
+        <p:nvCxnSpPr>
+          <p:cNvPr id="56" name="직선 연결선 55">
+            <a:extLst>
+              <a:ext uri="{FF2B5EF4-FFF2-40B4-BE49-F238E27FC236}">
+                <a16:creationId xmlns:a16="http://schemas.microsoft.com/office/drawing/2014/main" id="{720E4EEE-E961-4DF6-99E0-C229128534F1}"/>
+              </a:ext>
+            </a:extLst>
+          </p:cNvPr>
+          <p:cNvCxnSpPr>
+            <a:cxnSpLocks/>
+          </p:cNvCxnSpPr>
+          <p:nvPr/>
+        </p:nvCxnSpPr>
+        <p:spPr>
+          <a:xfrm>
+            <a:off x="7778038" y="1243257"/>
+            <a:ext cx="0" cy="2319750"/>
+          </a:xfrm>
+          <a:prstGeom prst="line">
+            <a:avLst/>
+          </a:prstGeom>
+          <a:ln>
+            <a:solidFill>
+              <a:schemeClr val="bg1">
+                <a:lumMod val="50000"/>
+              </a:schemeClr>
+            </a:solidFill>
+            <a:prstDash val="dash"/>
+          </a:ln>
+        </p:spPr>
+        <p:style>
+          <a:lnRef idx="1">
+            <a:schemeClr val="accent1"/>
+          </a:lnRef>
+          <a:fillRef idx="0">
+            <a:schemeClr val="accent1"/>
+          </a:fillRef>
+          <a:effectRef idx="0">
+            <a:schemeClr val="accent1"/>
+          </a:effectRef>
+          <a:fontRef idx="minor">
+            <a:schemeClr val="tx1"/>
+          </a:fontRef>
+        </p:style>
+      </p:cxnSp>
+      <p:cxnSp>
+        <p:nvCxnSpPr>
+          <p:cNvPr id="57" name="직선 연결선 56">
+            <a:extLst>
+              <a:ext uri="{FF2B5EF4-FFF2-40B4-BE49-F238E27FC236}">
+                <a16:creationId xmlns:a16="http://schemas.microsoft.com/office/drawing/2014/main" id="{41BF3400-77A4-4B7C-8A42-A8ACE4FD7EB2}"/>
+              </a:ext>
+            </a:extLst>
+          </p:cNvPr>
+          <p:cNvCxnSpPr>
+            <a:cxnSpLocks/>
+          </p:cNvCxnSpPr>
+          <p:nvPr/>
+        </p:nvCxnSpPr>
+        <p:spPr>
+          <a:xfrm>
+            <a:off x="8951518" y="1243257"/>
+            <a:ext cx="0" cy="2319750"/>
+          </a:xfrm>
+          <a:prstGeom prst="line">
+            <a:avLst/>
+          </a:prstGeom>
+          <a:ln>
+            <a:solidFill>
+              <a:schemeClr val="bg1">
+                <a:lumMod val="50000"/>
+              </a:schemeClr>
+            </a:solidFill>
+            <a:prstDash val="dash"/>
+          </a:ln>
+        </p:spPr>
+        <p:style>
+          <a:lnRef idx="1">
+            <a:schemeClr val="accent1"/>
+          </a:lnRef>
+          <a:fillRef idx="0">
+            <a:schemeClr val="accent1"/>
+          </a:fillRef>
+          <a:effectRef idx="0">
+            <a:schemeClr val="accent1"/>
+          </a:effectRef>
+          <a:fontRef idx="minor">
+            <a:schemeClr val="tx1"/>
+          </a:fontRef>
+        </p:style>
+      </p:cxnSp>
+      <p:cxnSp>
+        <p:nvCxnSpPr>
+          <p:cNvPr id="58" name="직선 연결선 57">
+            <a:extLst>
+              <a:ext uri="{FF2B5EF4-FFF2-40B4-BE49-F238E27FC236}">
+                <a16:creationId xmlns:a16="http://schemas.microsoft.com/office/drawing/2014/main" id="{96494532-2162-4424-9307-8F5FFFC5CA1D}"/>
+              </a:ext>
+            </a:extLst>
+          </p:cNvPr>
+          <p:cNvCxnSpPr>
+            <a:cxnSpLocks/>
+          </p:cNvCxnSpPr>
+          <p:nvPr/>
+        </p:nvCxnSpPr>
+        <p:spPr>
+          <a:xfrm>
+            <a:off x="6640124" y="1220730"/>
+            <a:ext cx="1131818" cy="0"/>
+          </a:xfrm>
+          <a:prstGeom prst="line">
+            <a:avLst/>
+          </a:prstGeom>
+          <a:ln>
+            <a:solidFill>
+              <a:schemeClr val="bg1">
+                <a:lumMod val="50000"/>
+              </a:schemeClr>
+            </a:solidFill>
+            <a:prstDash val="dash"/>
+          </a:ln>
+        </p:spPr>
+        <p:style>
+          <a:lnRef idx="1">
+            <a:schemeClr val="accent1"/>
+          </a:lnRef>
+          <a:fillRef idx="0">
+            <a:schemeClr val="accent1"/>
+          </a:fillRef>
+          <a:effectRef idx="0">
+            <a:schemeClr val="accent1"/>
+          </a:effectRef>
+          <a:fontRef idx="minor">
+            <a:schemeClr val="tx1"/>
+          </a:fontRef>
+        </p:style>
+      </p:cxnSp>
+      <mc:AlternateContent xmlns:mc="http://schemas.openxmlformats.org/markup-compatibility/2006">
+        <mc:Choice xmlns:a14="http://schemas.microsoft.com/office/drawing/2010/main" Requires="a14">
+          <p:sp>
+            <p:nvSpPr>
+              <p:cNvPr id="59" name="TextBox 58">
+                <a:extLst>
+                  <a:ext uri="{FF2B5EF4-FFF2-40B4-BE49-F238E27FC236}">
+                    <a16:creationId xmlns:a16="http://schemas.microsoft.com/office/drawing/2014/main" id="{9848A8B6-3632-43E5-A577-02436279C711}"/>
+                  </a:ext>
+                </a:extLst>
+              </p:cNvPr>
+              <p:cNvSpPr txBox="1"/>
+              <p:nvPr/>
+            </p:nvSpPr>
+            <p:spPr>
+              <a:xfrm>
+                <a:off x="6153529" y="1006455"/>
+                <a:ext cx="622738" cy="400110"/>
+              </a:xfrm>
+              <a:prstGeom prst="rect">
+                <a:avLst/>
+              </a:prstGeom>
+              <a:noFill/>
+            </p:spPr>
+            <p:txBody>
+              <a:bodyPr wrap="square" rtlCol="0">
+                <a:spAutoFit/>
+              </a:bodyPr>
+              <a:lstStyle/>
+              <a:p>
+                <a:pPr/>
+                <a14:m>
+                  <m:oMathPara xmlns:m="http://schemas.openxmlformats.org/officeDocument/2006/math">
+                    <m:oMathParaPr>
+                      <m:jc m:val="centerGroup"/>
+                    </m:oMathParaPr>
+                    <m:oMath xmlns:m="http://schemas.openxmlformats.org/officeDocument/2006/math">
+                      <m:r>
+                        <a:rPr lang="en-US" altLang="ko-KR" sz="2000" b="0" i="1" smtClean="0">
+                          <a:latin typeface="Cambria Math" panose="02040503050406030204" pitchFamily="18" charset="0"/>
+                        </a:rPr>
+                        <m:t>2</m:t>
+                      </m:r>
+                    </m:oMath>
+                  </m:oMathPara>
+                </a14:m>
+                <a:endParaRPr lang="ko-KR" altLang="en-US" sz="2000" dirty="0"/>
+              </a:p>
+            </p:txBody>
+          </p:sp>
+        </mc:Choice>
+        <mc:Fallback>
+          <p:sp>
+            <p:nvSpPr>
+              <p:cNvPr id="59" name="TextBox 58">
+                <a:extLst>
+                  <a:ext uri="{FF2B5EF4-FFF2-40B4-BE49-F238E27FC236}">
+                    <a16:creationId xmlns:a16="http://schemas.microsoft.com/office/drawing/2014/main" id="{9848A8B6-3632-43E5-A577-02436279C711}"/>
+                  </a:ext>
+                </a:extLst>
+              </p:cNvPr>
+              <p:cNvSpPr txBox="1">
+                <a:spLocks noRot="1" noChangeAspect="1" noMove="1" noResize="1" noEditPoints="1" noAdjustHandles="1" noChangeArrowheads="1" noChangeShapeType="1" noTextEdit="1"/>
+              </p:cNvSpPr>
+              <p:nvPr/>
+            </p:nvSpPr>
+            <p:spPr>
+              <a:xfrm>
+                <a:off x="6153529" y="1006455"/>
+                <a:ext cx="622738" cy="400110"/>
+              </a:xfrm>
+              <a:prstGeom prst="rect">
+                <a:avLst/>
+              </a:prstGeom>
+              <a:blipFill>
+                <a:blip r:embed="rId10"/>
+                <a:stretch>
+                  <a:fillRect/>
+                </a:stretch>
+              </a:blipFill>
+            </p:spPr>
+            <p:txBody>
+              <a:bodyPr/>
+              <a:lstStyle/>
+              <a:p>
+                <a:r>
+                  <a:rPr lang="ko-KR" altLang="en-US">
+                    <a:noFill/>
+                  </a:rPr>
+                  <a:t> </a:t>
+                </a:r>
+              </a:p>
+            </p:txBody>
+          </p:sp>
+        </mc:Fallback>
+      </mc:AlternateContent>
+      <mc:AlternateContent xmlns:mc="http://schemas.openxmlformats.org/markup-compatibility/2006">
+        <mc:Choice xmlns:a14="http://schemas.microsoft.com/office/drawing/2010/main" Requires="a14">
+          <p:sp>
+            <p:nvSpPr>
+              <p:cNvPr id="60" name="TextBox 59">
+                <a:extLst>
+                  <a:ext uri="{FF2B5EF4-FFF2-40B4-BE49-F238E27FC236}">
+                    <a16:creationId xmlns:a16="http://schemas.microsoft.com/office/drawing/2014/main" id="{C802F21E-446A-4A6C-8B58-D7BCC52329CE}"/>
+                  </a:ext>
+                </a:extLst>
+              </p:cNvPr>
+              <p:cNvSpPr txBox="1"/>
+              <p:nvPr/>
+            </p:nvSpPr>
+            <p:spPr>
+              <a:xfrm>
+                <a:off x="8641666" y="3509916"/>
+                <a:ext cx="622738" cy="400110"/>
+              </a:xfrm>
+              <a:prstGeom prst="rect">
+                <a:avLst/>
+              </a:prstGeom>
+              <a:noFill/>
+            </p:spPr>
+            <p:txBody>
+              <a:bodyPr wrap="square" rtlCol="0">
+                <a:spAutoFit/>
+              </a:bodyPr>
+              <a:lstStyle/>
+              <a:p>
+                <a:pPr/>
+                <a14:m>
+                  <m:oMathPara xmlns:m="http://schemas.openxmlformats.org/officeDocument/2006/math">
+                    <m:oMathParaPr>
+                      <m:jc m:val="centerGroup"/>
+                    </m:oMathParaPr>
+                    <m:oMath xmlns:m="http://schemas.openxmlformats.org/officeDocument/2006/math">
+                      <m:r>
+                        <a:rPr lang="en-US" altLang="ko-KR" sz="2000" b="0" i="1" smtClean="0">
+                          <a:latin typeface="Cambria Math" panose="02040503050406030204" pitchFamily="18" charset="0"/>
+                        </a:rPr>
+                        <m:t>2</m:t>
+                      </m:r>
+                    </m:oMath>
+                  </m:oMathPara>
+                </a14:m>
+                <a:endParaRPr lang="ko-KR" altLang="en-US" sz="2000" dirty="0"/>
+              </a:p>
+            </p:txBody>
+          </p:sp>
+        </mc:Choice>
+        <mc:Fallback>
+          <p:sp>
+            <p:nvSpPr>
+              <p:cNvPr id="60" name="TextBox 59">
+                <a:extLst>
+                  <a:ext uri="{FF2B5EF4-FFF2-40B4-BE49-F238E27FC236}">
+                    <a16:creationId xmlns:a16="http://schemas.microsoft.com/office/drawing/2014/main" id="{C802F21E-446A-4A6C-8B58-D7BCC52329CE}"/>
+                  </a:ext>
+                </a:extLst>
+              </p:cNvPr>
+              <p:cNvSpPr txBox="1">
+                <a:spLocks noRot="1" noChangeAspect="1" noMove="1" noResize="1" noEditPoints="1" noAdjustHandles="1" noChangeArrowheads="1" noChangeShapeType="1" noTextEdit="1"/>
+              </p:cNvSpPr>
+              <p:nvPr/>
+            </p:nvSpPr>
+            <p:spPr>
+              <a:xfrm>
+                <a:off x="8641666" y="3509916"/>
+                <a:ext cx="622738" cy="400110"/>
+              </a:xfrm>
+              <a:prstGeom prst="rect">
+                <a:avLst/>
+              </a:prstGeom>
+              <a:blipFill>
+                <a:blip r:embed="rId11"/>
+                <a:stretch>
+                  <a:fillRect/>
+                </a:stretch>
+              </a:blipFill>
+            </p:spPr>
+            <p:txBody>
+              <a:bodyPr/>
+              <a:lstStyle/>
+              <a:p>
+                <a:r>
+                  <a:rPr lang="ko-KR" altLang="en-US">
+                    <a:noFill/>
+                  </a:rPr>
+                  <a:t> </a:t>
+                </a:r>
+              </a:p>
+            </p:txBody>
+          </p:sp>
+        </mc:Fallback>
+      </mc:AlternateContent>
+      <mc:AlternateContent xmlns:mc="http://schemas.openxmlformats.org/markup-compatibility/2006">
+        <mc:Choice xmlns:a14="http://schemas.microsoft.com/office/drawing/2010/main" Requires="a14">
+          <p:sp>
+            <p:nvSpPr>
+              <p:cNvPr id="61" name="TextBox 60">
+                <a:extLst>
+                  <a:ext uri="{FF2B5EF4-FFF2-40B4-BE49-F238E27FC236}">
+                    <a16:creationId xmlns:a16="http://schemas.microsoft.com/office/drawing/2014/main" id="{9A654B82-D77D-4005-A9C3-C2D703C0D5D1}"/>
+                  </a:ext>
+                </a:extLst>
+              </p:cNvPr>
+              <p:cNvSpPr txBox="1"/>
+              <p:nvPr/>
+            </p:nvSpPr>
+            <p:spPr>
+              <a:xfrm>
+                <a:off x="3934066" y="3069934"/>
+                <a:ext cx="622738" cy="400110"/>
+              </a:xfrm>
+              <a:prstGeom prst="rect">
+                <a:avLst/>
+              </a:prstGeom>
+              <a:noFill/>
+            </p:spPr>
+            <p:txBody>
+              <a:bodyPr wrap="square" rtlCol="0">
+                <a:spAutoFit/>
+              </a:bodyPr>
+              <a:lstStyle/>
+              <a:p>
+                <a:pPr/>
+                <a14:m>
+                  <m:oMathPara xmlns:m="http://schemas.openxmlformats.org/officeDocument/2006/math">
+                    <m:oMathParaPr>
+                      <m:jc m:val="centerGroup"/>
+                    </m:oMathParaPr>
+                    <m:oMath xmlns:m="http://schemas.openxmlformats.org/officeDocument/2006/math">
+                      <m:r>
+                        <a:rPr lang="en-US" altLang="ko-KR" sz="2000" b="0" i="1" smtClean="0">
+                          <a:latin typeface="Cambria Math" panose="02040503050406030204" pitchFamily="18" charset="0"/>
+                        </a:rPr>
+                        <m:t>−2</m:t>
+                      </m:r>
+                    </m:oMath>
+                  </m:oMathPara>
+                </a14:m>
+                <a:endParaRPr lang="ko-KR" altLang="en-US" sz="2000" dirty="0"/>
+              </a:p>
+            </p:txBody>
+          </p:sp>
+        </mc:Choice>
+        <mc:Fallback>
+          <p:sp>
+            <p:nvSpPr>
+              <p:cNvPr id="61" name="TextBox 60">
+                <a:extLst>
+                  <a:ext uri="{FF2B5EF4-FFF2-40B4-BE49-F238E27FC236}">
+                    <a16:creationId xmlns:a16="http://schemas.microsoft.com/office/drawing/2014/main" id="{9A654B82-D77D-4005-A9C3-C2D703C0D5D1}"/>
+                  </a:ext>
+                </a:extLst>
+              </p:cNvPr>
+              <p:cNvSpPr txBox="1">
+                <a:spLocks noRot="1" noChangeAspect="1" noMove="1" noResize="1" noEditPoints="1" noAdjustHandles="1" noChangeArrowheads="1" noChangeShapeType="1" noTextEdit="1"/>
+              </p:cNvSpPr>
+              <p:nvPr/>
+            </p:nvSpPr>
+            <p:spPr>
+              <a:xfrm>
+                <a:off x="3934066" y="3069934"/>
+                <a:ext cx="622738" cy="400110"/>
+              </a:xfrm>
+              <a:prstGeom prst="rect">
+                <a:avLst/>
+              </a:prstGeom>
+              <a:blipFill>
+                <a:blip r:embed="rId12"/>
+                <a:stretch>
+                  <a:fillRect/>
+                </a:stretch>
+              </a:blipFill>
+            </p:spPr>
+            <p:txBody>
+              <a:bodyPr/>
+              <a:lstStyle/>
+              <a:p>
+                <a:r>
+                  <a:rPr lang="ko-KR" altLang="en-US">
+                    <a:noFill/>
+                  </a:rPr>
+                  <a:t> </a:t>
+                </a:r>
+              </a:p>
+            </p:txBody>
+          </p:sp>
+        </mc:Fallback>
+      </mc:AlternateContent>
+      <mc:AlternateContent xmlns:mc="http://schemas.openxmlformats.org/markup-compatibility/2006">
+        <mc:Choice xmlns:a14="http://schemas.microsoft.com/office/drawing/2010/main" Requires="a14">
+          <p:sp>
+            <p:nvSpPr>
+              <p:cNvPr id="63" name="TextBox 62">
+                <a:extLst>
+                  <a:ext uri="{FF2B5EF4-FFF2-40B4-BE49-F238E27FC236}">
+                    <a16:creationId xmlns:a16="http://schemas.microsoft.com/office/drawing/2014/main" id="{43919913-3CC9-4115-AB74-F0BCA8681164}"/>
+                  </a:ext>
+                </a:extLst>
+              </p:cNvPr>
+              <p:cNvSpPr txBox="1"/>
+              <p:nvPr/>
+            </p:nvSpPr>
+            <p:spPr>
+              <a:xfrm>
+                <a:off x="2796978" y="3069934"/>
+                <a:ext cx="622738" cy="400110"/>
+              </a:xfrm>
+              <a:prstGeom prst="rect">
+                <a:avLst/>
+              </a:prstGeom>
+              <a:noFill/>
+            </p:spPr>
+            <p:txBody>
+              <a:bodyPr wrap="square" rtlCol="0">
+                <a:spAutoFit/>
+              </a:bodyPr>
+              <a:lstStyle/>
+              <a:p>
+                <a:pPr/>
+                <a14:m>
+                  <m:oMathPara xmlns:m="http://schemas.openxmlformats.org/officeDocument/2006/math">
+                    <m:oMathParaPr>
+                      <m:jc m:val="centerGroup"/>
+                    </m:oMathParaPr>
+                    <m:oMath xmlns:m="http://schemas.openxmlformats.org/officeDocument/2006/math">
+                      <m:r>
+                        <a:rPr lang="en-US" altLang="ko-KR" sz="2000" b="0" i="1" smtClean="0">
+                          <a:latin typeface="Cambria Math" panose="02040503050406030204" pitchFamily="18" charset="0"/>
+                        </a:rPr>
+                        <m:t>−3</m:t>
+                      </m:r>
+                    </m:oMath>
+                  </m:oMathPara>
+                </a14:m>
+                <a:endParaRPr lang="ko-KR" altLang="en-US" sz="2000" dirty="0"/>
+              </a:p>
+            </p:txBody>
+          </p:sp>
+        </mc:Choice>
+        <mc:Fallback>
+          <p:sp>
+            <p:nvSpPr>
+              <p:cNvPr id="63" name="TextBox 62">
+                <a:extLst>
+                  <a:ext uri="{FF2B5EF4-FFF2-40B4-BE49-F238E27FC236}">
+                    <a16:creationId xmlns:a16="http://schemas.microsoft.com/office/drawing/2014/main" id="{43919913-3CC9-4115-AB74-F0BCA8681164}"/>
+                  </a:ext>
+                </a:extLst>
+              </p:cNvPr>
+              <p:cNvSpPr txBox="1">
+                <a:spLocks noRot="1" noChangeAspect="1" noMove="1" noResize="1" noEditPoints="1" noAdjustHandles="1" noChangeArrowheads="1" noChangeShapeType="1" noTextEdit="1"/>
+              </p:cNvSpPr>
+              <p:nvPr/>
+            </p:nvSpPr>
+            <p:spPr>
+              <a:xfrm>
+                <a:off x="2796978" y="3069934"/>
+                <a:ext cx="622738" cy="400110"/>
+              </a:xfrm>
+              <a:prstGeom prst="rect">
+                <a:avLst/>
+              </a:prstGeom>
+              <a:blipFill>
+                <a:blip r:embed="rId13"/>
+                <a:stretch>
+                  <a:fillRect/>
+                </a:stretch>
+              </a:blipFill>
+            </p:spPr>
+            <p:txBody>
+              <a:bodyPr/>
+              <a:lstStyle/>
+              <a:p>
+                <a:r>
+                  <a:rPr lang="ko-KR" altLang="en-US">
+                    <a:noFill/>
+                  </a:rPr>
+                  <a:t> </a:t>
+                </a:r>
+              </a:p>
+            </p:txBody>
+          </p:sp>
+        </mc:Fallback>
+      </mc:AlternateContent>
+      <mc:AlternateContent xmlns:mc="http://schemas.openxmlformats.org/markup-compatibility/2006">
+        <mc:Choice xmlns:a14="http://schemas.microsoft.com/office/drawing/2010/main" Requires="a14">
+          <p:sp>
+            <p:nvSpPr>
+              <p:cNvPr id="64" name="TextBox 63">
+                <a:extLst>
+                  <a:ext uri="{FF2B5EF4-FFF2-40B4-BE49-F238E27FC236}">
+                    <a16:creationId xmlns:a16="http://schemas.microsoft.com/office/drawing/2014/main" id="{83D18186-637C-46A8-A4BB-57396F32022E}"/>
+                  </a:ext>
+                </a:extLst>
+              </p:cNvPr>
+              <p:cNvSpPr txBox="1"/>
+              <p:nvPr/>
+            </p:nvSpPr>
+            <p:spPr>
+              <a:xfrm>
+                <a:off x="6533775" y="5675104"/>
+                <a:ext cx="622738" cy="400110"/>
+              </a:xfrm>
+              <a:prstGeom prst="rect">
+                <a:avLst/>
+              </a:prstGeom>
+              <a:noFill/>
+            </p:spPr>
+            <p:txBody>
+              <a:bodyPr wrap="square" rtlCol="0">
+                <a:spAutoFit/>
+              </a:bodyPr>
+              <a:lstStyle/>
+              <a:p>
+                <a:pPr/>
+                <a14:m>
+                  <m:oMathPara xmlns:m="http://schemas.openxmlformats.org/officeDocument/2006/math">
+                    <m:oMathParaPr>
+                      <m:jc m:val="centerGroup"/>
+                    </m:oMathParaPr>
+                    <m:oMath xmlns:m="http://schemas.openxmlformats.org/officeDocument/2006/math">
+                      <m:r>
+                        <a:rPr lang="en-US" altLang="ko-KR" sz="2000" b="0" i="1" smtClean="0">
+                          <a:latin typeface="Cambria Math" panose="02040503050406030204" pitchFamily="18" charset="0"/>
+                        </a:rPr>
+                        <m:t>−2</m:t>
+                      </m:r>
+                    </m:oMath>
+                  </m:oMathPara>
+                </a14:m>
+                <a:endParaRPr lang="ko-KR" altLang="en-US" sz="2000" dirty="0"/>
+              </a:p>
+            </p:txBody>
+          </p:sp>
+        </mc:Choice>
+        <mc:Fallback>
+          <p:sp>
+            <p:nvSpPr>
+              <p:cNvPr id="64" name="TextBox 63">
+                <a:extLst>
+                  <a:ext uri="{FF2B5EF4-FFF2-40B4-BE49-F238E27FC236}">
+                    <a16:creationId xmlns:a16="http://schemas.microsoft.com/office/drawing/2014/main" id="{83D18186-637C-46A8-A4BB-57396F32022E}"/>
+                  </a:ext>
+                </a:extLst>
+              </p:cNvPr>
+              <p:cNvSpPr txBox="1">
+                <a:spLocks noRot="1" noChangeAspect="1" noMove="1" noResize="1" noEditPoints="1" noAdjustHandles="1" noChangeArrowheads="1" noChangeShapeType="1" noTextEdit="1"/>
+              </p:cNvSpPr>
+              <p:nvPr/>
+            </p:nvSpPr>
+            <p:spPr>
+              <a:xfrm>
+                <a:off x="6533775" y="5675104"/>
+                <a:ext cx="622738" cy="400110"/>
+              </a:xfrm>
+              <a:prstGeom prst="rect">
+                <a:avLst/>
+              </a:prstGeom>
+              <a:blipFill>
+                <a:blip r:embed="rId14"/>
+                <a:stretch>
+                  <a:fillRect/>
+                </a:stretch>
+              </a:blipFill>
+            </p:spPr>
+            <p:txBody>
+              <a:bodyPr/>
+              <a:lstStyle/>
+              <a:p>
+                <a:r>
+                  <a:rPr lang="ko-KR" altLang="en-US">
+                    <a:noFill/>
+                  </a:rPr>
+                  <a:t> </a:t>
+                </a:r>
+              </a:p>
+            </p:txBody>
+          </p:sp>
+        </mc:Fallback>
+      </mc:AlternateContent>
+      <mc:AlternateContent xmlns:mc="http://schemas.openxmlformats.org/markup-compatibility/2006">
+        <mc:Choice xmlns:a14="http://schemas.microsoft.com/office/drawing/2010/main" Requires="a14">
+          <p:sp>
+            <p:nvSpPr>
+              <p:cNvPr id="65" name="TextBox 64">
+                <a:extLst>
+                  <a:ext uri="{FF2B5EF4-FFF2-40B4-BE49-F238E27FC236}">
+                    <a16:creationId xmlns:a16="http://schemas.microsoft.com/office/drawing/2014/main" id="{9585FF7B-9CF4-4083-9E2A-EB033E21FEAF}"/>
+                  </a:ext>
+                </a:extLst>
+              </p:cNvPr>
+              <p:cNvSpPr txBox="1"/>
+              <p:nvPr/>
+            </p:nvSpPr>
+            <p:spPr>
+              <a:xfrm>
+                <a:off x="7618227" y="579604"/>
+                <a:ext cx="1498855" cy="400110"/>
+              </a:xfrm>
+              <a:prstGeom prst="rect">
+                <a:avLst/>
+              </a:prstGeom>
+              <a:noFill/>
+            </p:spPr>
+            <p:txBody>
+              <a:bodyPr wrap="square" rtlCol="0">
+                <a:spAutoFit/>
+              </a:bodyPr>
+              <a:lstStyle/>
+              <a:p>
+                <a:pPr/>
+                <a14:m>
+                  <m:oMathPara xmlns:m="http://schemas.openxmlformats.org/officeDocument/2006/math">
+                    <m:oMathParaPr>
+                      <m:jc m:val="centerGroup"/>
+                    </m:oMathParaPr>
+                    <m:oMath xmlns:m="http://schemas.openxmlformats.org/officeDocument/2006/math">
+                      <m:r>
+                        <a:rPr lang="en-US" altLang="ko-KR" sz="2000" b="0" i="1" smtClean="0">
+                          <a:latin typeface="Cambria Math" panose="02040503050406030204" pitchFamily="18" charset="0"/>
+                        </a:rPr>
+                        <m:t>𝑦</m:t>
+                      </m:r>
+                      <m:r>
+                        <a:rPr lang="en-US" altLang="ko-KR" sz="2000" b="0" i="1" smtClean="0">
+                          <a:latin typeface="Cambria Math" panose="02040503050406030204" pitchFamily="18" charset="0"/>
+                        </a:rPr>
+                        <m:t>=</m:t>
+                      </m:r>
+                      <m:r>
+                        <a:rPr lang="en-US" altLang="ko-KR" sz="2000" b="0" i="1" smtClean="0">
+                          <a:latin typeface="Cambria Math" panose="02040503050406030204" pitchFamily="18" charset="0"/>
+                        </a:rPr>
+                        <m:t>𝑓</m:t>
+                      </m:r>
+                      <m:r>
+                        <a:rPr lang="en-US" altLang="ko-KR" sz="2000" b="0" i="1" smtClean="0">
+                          <a:latin typeface="Cambria Math" panose="02040503050406030204" pitchFamily="18" charset="0"/>
+                        </a:rPr>
+                        <m:t>(</m:t>
+                      </m:r>
+                      <m:r>
+                        <a:rPr lang="en-US" altLang="ko-KR" sz="2000" b="0" i="1" smtClean="0">
+                          <a:latin typeface="Cambria Math" panose="02040503050406030204" pitchFamily="18" charset="0"/>
+                        </a:rPr>
+                        <m:t>𝑥</m:t>
+                      </m:r>
+                      <m:r>
+                        <a:rPr lang="en-US" altLang="ko-KR" sz="2000" b="0" i="1" smtClean="0">
+                          <a:latin typeface="Cambria Math" panose="02040503050406030204" pitchFamily="18" charset="0"/>
+                        </a:rPr>
+                        <m:t>)</m:t>
+                      </m:r>
+                    </m:oMath>
+                  </m:oMathPara>
+                </a14:m>
+                <a:endParaRPr lang="ko-KR" altLang="en-US" sz="2000" dirty="0"/>
+              </a:p>
+            </p:txBody>
+          </p:sp>
+        </mc:Choice>
+        <mc:Fallback>
+          <p:sp>
+            <p:nvSpPr>
+              <p:cNvPr id="65" name="TextBox 64">
+                <a:extLst>
+                  <a:ext uri="{FF2B5EF4-FFF2-40B4-BE49-F238E27FC236}">
+                    <a16:creationId xmlns:a16="http://schemas.microsoft.com/office/drawing/2014/main" id="{9585FF7B-9CF4-4083-9E2A-EB033E21FEAF}"/>
+                  </a:ext>
+                </a:extLst>
+              </p:cNvPr>
+              <p:cNvSpPr txBox="1">
+                <a:spLocks noRot="1" noChangeAspect="1" noMove="1" noResize="1" noEditPoints="1" noAdjustHandles="1" noChangeArrowheads="1" noChangeShapeType="1" noTextEdit="1"/>
+              </p:cNvSpPr>
+              <p:nvPr/>
+            </p:nvSpPr>
+            <p:spPr>
+              <a:xfrm>
+                <a:off x="7618227" y="579604"/>
+                <a:ext cx="1498855" cy="400110"/>
+              </a:xfrm>
+              <a:prstGeom prst="rect">
+                <a:avLst/>
+              </a:prstGeom>
+              <a:blipFill>
+                <a:blip r:embed="rId15"/>
+                <a:stretch>
+                  <a:fillRect b="-18182"/>
+                </a:stretch>
+              </a:blipFill>
+            </p:spPr>
+            <p:txBody>
+              <a:bodyPr/>
+              <a:lstStyle/>
+              <a:p>
+                <a:r>
+                  <a:rPr lang="ko-KR" altLang="en-US">
+                    <a:noFill/>
+                  </a:rPr>
+                  <a:t> </a:t>
+                </a:r>
+              </a:p>
+            </p:txBody>
+          </p:sp>
+        </mc:Fallback>
+      </mc:AlternateContent>
     </p:spTree>
     <p:extLst>
       <p:ext uri="{BB962C8B-B14F-4D97-AF65-F5344CB8AC3E}">

</xml_diff>